<commit_message>
Added Technology Evaluation Deliverable
</commit_message>
<xml_diff>
--- a/docs/presentation/Technologie-Evaluation Zusammenfassung.pptx
+++ b/docs/presentation/Technologie-Evaluation Zusammenfassung.pptx
@@ -5,7 +5,7 @@
     <p:sldMasterId id="2147483660" r:id="rId1"/>
   </p:sldMasterIdLst>
   <p:notesMasterIdLst>
-    <p:notesMasterId r:id="rId22"/>
+    <p:notesMasterId r:id="rId23"/>
   </p:notesMasterIdLst>
   <p:sldIdLst>
     <p:sldId id="256" r:id="rId2"/>
@@ -22,12 +22,13 @@
     <p:sldId id="273" r:id="rId13"/>
     <p:sldId id="274" r:id="rId14"/>
     <p:sldId id="275" r:id="rId15"/>
-    <p:sldId id="257" r:id="rId16"/>
-    <p:sldId id="258" r:id="rId17"/>
-    <p:sldId id="259" r:id="rId18"/>
-    <p:sldId id="261" r:id="rId19"/>
-    <p:sldId id="260" r:id="rId20"/>
-    <p:sldId id="262" r:id="rId21"/>
+    <p:sldId id="276" r:id="rId16"/>
+    <p:sldId id="257" r:id="rId17"/>
+    <p:sldId id="258" r:id="rId18"/>
+    <p:sldId id="259" r:id="rId19"/>
+    <p:sldId id="261" r:id="rId20"/>
+    <p:sldId id="260" r:id="rId21"/>
+    <p:sldId id="262" r:id="rId22"/>
   </p:sldIdLst>
   <p:sldSz cx="12192000" cy="6858000"/>
   <p:notesSz cx="6858000" cy="9144000"/>
@@ -175,6 +176,7 @@
           </a:p>
         </c:rich>
       </c:tx>
+      <c:layout/>
       <c:overlay val="0"/>
       <c:spPr>
         <a:noFill/>
@@ -237,31 +239,28 @@
           <c:invertIfNegative val="0"/>
           <c:cat>
             <c:strRef>
-              <c:f>Tabelle1!$A$2:$A$9</c:f>
+              <c:f>Tabelle1!$A$2:$A$8</c:f>
               <c:strCache>
-                <c:ptCount val="8"/>
+                <c:ptCount val="7"/>
                 <c:pt idx="0">
-                  <c:v>HTML/CSS</c:v>
+                  <c:v>JavaScript</c:v>
                 </c:pt>
                 <c:pt idx="1">
-                  <c:v>JavaScript</c:v>
+                  <c:v>Java</c:v>
                 </c:pt>
                 <c:pt idx="2">
-                  <c:v>Java</c:v>
+                  <c:v>Python</c:v>
                 </c:pt>
                 <c:pt idx="3">
-                  <c:v>Python</c:v>
+                  <c:v>TypeScript</c:v>
                 </c:pt>
                 <c:pt idx="4">
-                  <c:v>TypeScript</c:v>
+                  <c:v>Golang</c:v>
                 </c:pt>
                 <c:pt idx="5">
-                  <c:v>Golang</c:v>
+                  <c:v>PHP</c:v>
                 </c:pt>
                 <c:pt idx="6">
-                  <c:v>PHP</c:v>
-                </c:pt>
-                <c:pt idx="7">
                   <c:v>C#</c:v>
                 </c:pt>
               </c:strCache>
@@ -269,21 +268,21 @@
           </c:cat>
           <c:val>
             <c:numRef>
-              <c:f>Tabelle1!$B$2:$B$9</c:f>
+              <c:f>Tabelle1!$B$2:$B$8</c:f>
               <c:numCache>
                 <c:formatCode>General</c:formatCode>
-                <c:ptCount val="8"/>
+                <c:ptCount val="7"/>
                 <c:pt idx="0">
-                  <c:v>10</c:v>
+                  <c:v>9</c:v>
                 </c:pt>
                 <c:pt idx="1">
                   <c:v>9</c:v>
                 </c:pt>
                 <c:pt idx="2">
-                  <c:v>9</c:v>
+                  <c:v>2</c:v>
                 </c:pt>
                 <c:pt idx="3">
-                  <c:v>2</c:v>
+                  <c:v>1</c:v>
                 </c:pt>
                 <c:pt idx="4">
                   <c:v>1</c:v>
@@ -292,9 +291,6 @@
                   <c:v>1</c:v>
                 </c:pt>
                 <c:pt idx="6">
-                  <c:v>1</c:v>
-                </c:pt>
-                <c:pt idx="7">
                   <c:v>1</c:v>
                 </c:pt>
               </c:numCache>
@@ -436,6 +432,7 @@
     </c:plotArea>
     <c:legend>
       <c:legendPos val="b"/>
+      <c:layout/>
       <c:overlay val="0"/>
       <c:spPr>
         <a:noFill/>
@@ -537,6 +534,7 @@
           </a:p>
         </c:rich>
       </c:tx>
+      <c:layout/>
       <c:overlay val="0"/>
       <c:spPr>
         <a:noFill/>
@@ -810,6 +808,7 @@
     </c:plotArea>
     <c:legend>
       <c:legendPos val="b"/>
+      <c:layout/>
       <c:overlay val="0"/>
       <c:spPr>
         <a:noFill/>
@@ -12501,7 +12500,7 @@
       </dsp:nvSpPr>
       <dsp:spPr>
         <a:xfrm>
-          <a:off x="78526" y="269801"/>
+          <a:off x="78526" y="269802"/>
           <a:ext cx="899964" cy="899964"/>
         </a:xfrm>
         <a:prstGeom prst="ellipse">
@@ -22754,7 +22753,7 @@
           <a:p>
             <a:fld id="{39509BE0-A418-427F-AF71-B75274FB1E24}" type="datetimeFigureOut">
               <a:rPr lang="en-US" smtClean="0"/>
-              <a:t>5/23/2016</a:t>
+              <a:t>5/24/2016</a:t>
             </a:fld>
             <a:endParaRPr lang="en-US"/>
           </a:p>
@@ -23174,7 +23173,7 @@
           <a:p>
             <a:fld id="{E3989A45-270E-4F66-B913-3F43A767EF45}" type="slidenum">
               <a:rPr lang="en-US" smtClean="0"/>
-              <a:t>19</a:t>
+              <a:t>20</a:t>
             </a:fld>
             <a:endParaRPr lang="en-US"/>
           </a:p>
@@ -23573,6 +23572,57 @@
           <a:bodyPr/>
           <a:lstStyle/>
           <a:p>
+            <a:r>
+              <a:rPr lang="de-DE" dirty="0" smtClean="0"/>
+              <a:t>Attribut-Beschreibung:</a:t>
+            </a:r>
+            <a:br>
+              <a:rPr lang="de-DE" dirty="0" smtClean="0"/>
+            </a:br>
+            <a:r>
+              <a:rPr lang="de-DE" dirty="0" smtClean="0"/>
+              <a:t>Stand-</a:t>
+            </a:r>
+            <a:r>
+              <a:rPr lang="de-DE" dirty="0" err="1" smtClean="0"/>
+              <a:t>alone</a:t>
+            </a:r>
+            <a:r>
+              <a:rPr lang="de-DE" dirty="0" smtClean="0"/>
+              <a:t>:</a:t>
+            </a:r>
+            <a:r>
+              <a:rPr lang="de-DE" baseline="0" dirty="0" smtClean="0"/>
+              <a:t>	Kann die Search Engine eigenständig betrieben werden?</a:t>
+            </a:r>
+          </a:p>
+          <a:p>
+            <a:r>
+              <a:rPr lang="de-DE" baseline="0" dirty="0" err="1" smtClean="0"/>
+              <a:t>Embeddable</a:t>
+            </a:r>
+            <a:r>
+              <a:rPr lang="de-DE" baseline="0" dirty="0" smtClean="0"/>
+              <a:t>:	Kann die Search Engine in ein Programm eingebettet werden?</a:t>
+            </a:r>
+          </a:p>
+          <a:p>
+            <a:r>
+              <a:rPr lang="de-DE" baseline="0" dirty="0" smtClean="0"/>
+              <a:t>API:	Wie können andere Komponenten mit der Search Engine kommunizieren?</a:t>
+            </a:r>
+          </a:p>
+          <a:p>
+            <a:r>
+              <a:rPr lang="de-DE" baseline="0" dirty="0" smtClean="0"/>
+              <a:t>Daten-Format:	Welche Daten-Formate können von der Search Engine indiziert und gesucht werden?</a:t>
+            </a:r>
+          </a:p>
+          <a:p>
+            <a:r>
+              <a:rPr lang="de-DE" baseline="0" dirty="0" smtClean="0"/>
+              <a:t>Daten-Quelle:	Wie (explizit/implizit) und woher kann die Search Engine Daten beziehen?</a:t>
+            </a:r>
             <a:endParaRPr lang="en-US" dirty="0"/>
           </a:p>
         </p:txBody>
@@ -23957,7 +24007,7 @@
           <a:p>
             <a:fld id="{E3989A45-270E-4F66-B913-3F43A767EF45}" type="slidenum">
               <a:rPr lang="en-US" smtClean="0"/>
-              <a:t>15</a:t>
+              <a:t>16</a:t>
             </a:fld>
             <a:endParaRPr lang="en-US"/>
           </a:p>
@@ -24162,7 +24212,7 @@
           <a:p>
             <a:fld id="{50DCC9CC-1F1A-4A81-B76F-203BF01F5197}" type="datetime1">
               <a:rPr lang="en-US" smtClean="0"/>
-              <a:t>5/23/2016</a:t>
+              <a:t>5/24/2016</a:t>
             </a:fld>
             <a:endParaRPr lang="en-US"/>
           </a:p>
@@ -24437,7 +24487,7 @@
           <a:p>
             <a:fld id="{7CFA85EE-4A52-4691-B87C-ECDEB21DEF95}" type="datetime1">
               <a:rPr lang="en-US" smtClean="0"/>
-              <a:t>5/23/2016</a:t>
+              <a:t>5/24/2016</a:t>
             </a:fld>
             <a:endParaRPr lang="en-US"/>
           </a:p>
@@ -24631,7 +24681,7 @@
           <a:p>
             <a:fld id="{3195B224-9351-4199-98F9-1FEBC7F90D73}" type="datetime1">
               <a:rPr lang="en-US" smtClean="0"/>
-              <a:t>5/23/2016</a:t>
+              <a:t>5/24/2016</a:t>
             </a:fld>
             <a:endParaRPr lang="en-US"/>
           </a:p>
@@ -24904,7 +24954,7 @@
           <a:p>
             <a:fld id="{1A6C339C-A818-4BDD-80D5-9DED5F276D09}" type="datetime1">
               <a:rPr lang="en-US" smtClean="0"/>
-              <a:t>5/23/2016</a:t>
+              <a:t>5/24/2016</a:t>
             </a:fld>
             <a:endParaRPr lang="en-US"/>
           </a:p>
@@ -25245,7 +25295,7 @@
           <a:p>
             <a:fld id="{D347AF81-3915-49CC-859C-568386E89965}" type="datetime1">
               <a:rPr lang="en-US" smtClean="0"/>
-              <a:t>5/23/2016</a:t>
+              <a:t>5/24/2016</a:t>
             </a:fld>
             <a:endParaRPr lang="en-US"/>
           </a:p>
@@ -25868,7 +25918,7 @@
           <a:p>
             <a:fld id="{7FFEF65F-86DF-4C4A-898F-043521815BCD}" type="datetime1">
               <a:rPr lang="en-US" smtClean="0"/>
-              <a:t>5/23/2016</a:t>
+              <a:t>5/24/2016</a:t>
             </a:fld>
             <a:endParaRPr lang="en-US"/>
           </a:p>
@@ -26728,7 +26778,7 @@
           <a:p>
             <a:fld id="{DC5322E3-B90B-4BAF-A60D-EE27C94B3E16}" type="datetime1">
               <a:rPr lang="en-US" smtClean="0"/>
-              <a:t>5/23/2016</a:t>
+              <a:t>5/24/2016</a:t>
             </a:fld>
             <a:endParaRPr lang="en-US"/>
           </a:p>
@@ -26898,7 +26948,7 @@
           <a:p>
             <a:fld id="{9FF2AEFC-3D39-4A5C-B81A-E9A8BC13F3FE}" type="datetime1">
               <a:rPr lang="en-US" smtClean="0"/>
-              <a:t>5/23/2016</a:t>
+              <a:t>5/24/2016</a:t>
             </a:fld>
             <a:endParaRPr lang="en-US"/>
           </a:p>
@@ -27078,7 +27128,7 @@
           <a:p>
             <a:fld id="{CB2C6525-039C-49F9-9400-9D29D66B8F64}" type="datetime1">
               <a:rPr lang="en-US" smtClean="0"/>
-              <a:t>5/23/2016</a:t>
+              <a:t>5/24/2016</a:t>
             </a:fld>
             <a:endParaRPr lang="en-US"/>
           </a:p>
@@ -27248,7 +27298,7 @@
           <a:p>
             <a:fld id="{2DF68BBF-F241-4CF1-AB2E-B39665398DB0}" type="datetime1">
               <a:rPr lang="en-US" smtClean="0"/>
-              <a:t>5/23/2016</a:t>
+              <a:t>5/24/2016</a:t>
             </a:fld>
             <a:endParaRPr lang="en-US"/>
           </a:p>
@@ -27495,7 +27545,7 @@
           <a:p>
             <a:fld id="{8A7ADA6C-E110-4B20-8D6C-60C576D1D79C}" type="datetime1">
               <a:rPr lang="en-US" smtClean="0"/>
-              <a:t>5/23/2016</a:t>
+              <a:t>5/24/2016</a:t>
             </a:fld>
             <a:endParaRPr lang="en-US"/>
           </a:p>
@@ -27787,7 +27837,7 @@
           <a:p>
             <a:fld id="{8BD5F39F-26E3-4EC9-BA99-14EC55B33568}" type="datetime1">
               <a:rPr lang="en-US" smtClean="0"/>
-              <a:t>5/23/2016</a:t>
+              <a:t>5/24/2016</a:t>
             </a:fld>
             <a:endParaRPr lang="en-US"/>
           </a:p>
@@ -28231,7 +28281,7 @@
           <a:p>
             <a:fld id="{B16507CC-926E-4945-829C-983C41D52767}" type="datetime1">
               <a:rPr lang="en-US" smtClean="0"/>
-              <a:t>5/23/2016</a:t>
+              <a:t>5/24/2016</a:t>
             </a:fld>
             <a:endParaRPr lang="en-US"/>
           </a:p>
@@ -28349,7 +28399,7 @@
           <a:p>
             <a:fld id="{7289CEC2-BE3F-4794-B729-52646094EFD0}" type="datetime1">
               <a:rPr lang="en-US" smtClean="0"/>
-              <a:t>5/23/2016</a:t>
+              <a:t>5/24/2016</a:t>
             </a:fld>
             <a:endParaRPr lang="en-US"/>
           </a:p>
@@ -28444,7 +28494,7 @@
           <a:p>
             <a:fld id="{84B1B87D-9C49-495F-9B2B-0D582928919C}" type="datetime1">
               <a:rPr lang="en-US" smtClean="0"/>
-              <a:t>5/23/2016</a:t>
+              <a:t>5/24/2016</a:t>
             </a:fld>
             <a:endParaRPr lang="en-US"/>
           </a:p>
@@ -28723,7 +28773,7 @@
           <a:p>
             <a:fld id="{5610D0E0-FFB1-4BEF-9BC8-B442795F578C}" type="datetime1">
               <a:rPr lang="en-US" smtClean="0"/>
-              <a:t>5/23/2016</a:t>
+              <a:t>5/24/2016</a:t>
             </a:fld>
             <a:endParaRPr lang="en-US"/>
           </a:p>
@@ -28998,7 +29048,7 @@
           <a:p>
             <a:fld id="{91B0C9A9-8E69-4E08-A674-EF784E393FE3}" type="datetime1">
               <a:rPr lang="en-US" smtClean="0"/>
-              <a:t>5/23/2016</a:t>
+              <a:t>5/24/2016</a:t>
             </a:fld>
             <a:endParaRPr lang="en-US"/>
           </a:p>
@@ -29427,7 +29477,7 @@
           <a:p>
             <a:fld id="{15753D6B-29A0-4B6A-991E-4BC81FCC1FAF}" type="datetime1">
               <a:rPr lang="en-US" smtClean="0"/>
-              <a:t>5/23/2016</a:t>
+              <a:t>5/24/2016</a:t>
             </a:fld>
             <a:endParaRPr lang="en-US"/>
           </a:p>
@@ -30220,14 +30270,14 @@
             <p:ph idx="1"/>
             <p:extLst>
               <p:ext uri="{D42A27DB-BD31-4B8C-83A1-F6EECF244321}">
-                <p14:modId xmlns:p14="http://schemas.microsoft.com/office/powerpoint/2010/main" val="134989618"/>
+                <p14:modId xmlns:p14="http://schemas.microsoft.com/office/powerpoint/2010/main" val="2277734257"/>
               </p:ext>
             </p:extLst>
           </p:nvPr>
         </p:nvGraphicFramePr>
         <p:xfrm>
           <a:off x="538235" y="2052638"/>
-          <a:ext cx="9396877" cy="4023360"/>
+          <a:ext cx="9396877" cy="4572000"/>
         </p:xfrm>
         <a:graphic>
           <a:graphicData uri="http://schemas.openxmlformats.org/drawingml/2006/table">
@@ -30243,42 +30293,42 @@
                     </a:ext>
                   </a:extLst>
                 </a:gridCol>
-                <a:gridCol w="975570">
+                <a:gridCol w="924199">
                   <a:extLst>
                     <a:ext uri="{9D8B030D-6E8A-4147-A177-3AD203B41FA5}">
                       <a16:colId xmlns:a16="http://schemas.microsoft.com/office/drawing/2014/main" val="3927811270"/>
                     </a:ext>
                   </a:extLst>
                 </a:gridCol>
-                <a:gridCol w="1709252">
+                <a:gridCol w="1191802">
                   <a:extLst>
                     <a:ext uri="{9D8B030D-6E8A-4147-A177-3AD203B41FA5}">
                       <a16:colId xmlns:a16="http://schemas.microsoft.com/office/drawing/2014/main" val="2415146205"/>
                     </a:ext>
                   </a:extLst>
                 </a:gridCol>
-                <a:gridCol w="869562">
+                <a:gridCol w="1315092">
                   <a:extLst>
                     <a:ext uri="{9D8B030D-6E8A-4147-A177-3AD203B41FA5}">
                       <a16:colId xmlns:a16="http://schemas.microsoft.com/office/drawing/2014/main" val="3607135631"/>
                     </a:ext>
                   </a:extLst>
                 </a:gridCol>
-                <a:gridCol w="1489753">
+                <a:gridCol w="1613044">
                   <a:extLst>
                     <a:ext uri="{9D8B030D-6E8A-4147-A177-3AD203B41FA5}">
                       <a16:colId xmlns:a16="http://schemas.microsoft.com/office/drawing/2014/main" val="1016005752"/>
                     </a:ext>
                   </a:extLst>
                 </a:gridCol>
-                <a:gridCol w="1376737">
+                <a:gridCol w="1489752">
                   <a:extLst>
                     <a:ext uri="{9D8B030D-6E8A-4147-A177-3AD203B41FA5}">
                       <a16:colId xmlns:a16="http://schemas.microsoft.com/office/drawing/2014/main" val="2834042373"/>
                     </a:ext>
                   </a:extLst>
                 </a:gridCol>
-                <a:gridCol w="1633592">
+                <a:gridCol w="1520577">
                   <a:extLst>
                     <a:ext uri="{9D8B030D-6E8A-4147-A177-3AD203B41FA5}">
                       <a16:colId xmlns:a16="http://schemas.microsoft.com/office/drawing/2014/main" val="4064223374"/>
@@ -30321,8 +30371,8 @@
                     <a:lstStyle/>
                     <a:p>
                       <a:r>
-                        <a:rPr lang="de-DE" noProof="0" dirty="0" err="1" smtClean="0"/>
-                        <a:t>Embeddable</a:t>
+                        <a:rPr lang="de-DE" noProof="0" dirty="0" smtClean="0"/>
+                        <a:t>Integrier-bar</a:t>
                       </a:r>
                       <a:endParaRPr lang="de-DE" noProof="0" dirty="0"/>
                     </a:p>
@@ -30350,7 +30400,7 @@
                     <a:p>
                       <a:r>
                         <a:rPr lang="de-DE" noProof="0" dirty="0" smtClean="0"/>
-                        <a:t>Format</a:t>
+                        <a:t>Daten-Format</a:t>
                       </a:r>
                       <a:endParaRPr lang="de-DE" noProof="0" dirty="0"/>
                     </a:p>
@@ -30364,11 +30414,7 @@
                     <a:p>
                       <a:r>
                         <a:rPr lang="de-DE" noProof="0" dirty="0" smtClean="0"/>
-                        <a:t>Integrierte </a:t>
-                      </a:r>
-                      <a:r>
-                        <a:rPr lang="de-DE" noProof="0" dirty="0" err="1" smtClean="0"/>
-                        <a:t>Dateiver-waltung</a:t>
+                        <a:t>Daten-Quelle</a:t>
                       </a:r>
                       <a:endParaRPr lang="de-DE" noProof="0" dirty="0"/>
                     </a:p>
@@ -30382,11 +30428,7 @@
                     <a:p>
                       <a:r>
                         <a:rPr lang="de-DE" noProof="0" dirty="0" smtClean="0"/>
-                        <a:t>Datei-</a:t>
-                      </a:r>
-                      <a:r>
-                        <a:rPr lang="de-DE" noProof="0" dirty="0" err="1" smtClean="0"/>
-                        <a:t>Sourcen</a:t>
+                        <a:t>Lizenz</a:t>
                       </a:r>
                       <a:endParaRPr lang="de-DE" noProof="0" dirty="0"/>
                     </a:p>
@@ -30433,10 +30475,10 @@
                     <a:p>
                       <a:pPr algn="ctr"/>
                       <a:r>
-                        <a:rPr lang="de-DE" noProof="0" dirty="0" smtClean="0"/>
+                        <a:rPr lang="de-DE" sz="1600" noProof="0" dirty="0" smtClean="0"/>
                         <a:t>Ja</a:t>
                       </a:r>
-                      <a:endParaRPr lang="de-DE" noProof="0" dirty="0"/>
+                      <a:endParaRPr lang="de-DE" sz="1600" noProof="0" dirty="0"/>
                     </a:p>
                   </a:txBody>
                   <a:tcPr/>
@@ -30448,10 +30490,10 @@
                     <a:p>
                       <a:pPr algn="ctr"/>
                       <a:r>
-                        <a:rPr lang="de-DE" noProof="0" dirty="0" smtClean="0"/>
+                        <a:rPr lang="de-DE" sz="1600" noProof="0" dirty="0" smtClean="0"/>
                         <a:t>Java</a:t>
                       </a:r>
-                      <a:endParaRPr lang="de-DE" noProof="0" dirty="0"/>
+                      <a:endParaRPr lang="de-DE" sz="1600" noProof="0" dirty="0"/>
                     </a:p>
                   </a:txBody>
                   <a:tcPr/>
@@ -30462,10 +30504,40 @@
                     <a:lstStyle/>
                     <a:p>
                       <a:r>
-                        <a:rPr lang="de-DE" noProof="0" dirty="0" smtClean="0"/>
-                        <a:t>Java</a:t>
+                        <a:rPr lang="de-DE" sz="1600" noProof="0" dirty="0" smtClean="0"/>
+                        <a:t>Nativ Java</a:t>
                       </a:r>
-                      <a:endParaRPr lang="de-DE" noProof="0" dirty="0"/>
+                      <a:endParaRPr lang="de-DE" sz="1600" noProof="0" dirty="0"/>
+                    </a:p>
+                  </a:txBody>
+                  <a:tcPr/>
+                </a:tc>
+                <a:tc>
+                  <a:txBody>
+                    <a:bodyPr/>
+                    <a:lstStyle/>
+                    <a:p>
+                      <a:pPr algn="l"/>
+                      <a:r>
+                        <a:rPr lang="de-DE" sz="1600" noProof="0" dirty="0" smtClean="0"/>
+                        <a:t>org.apache.lucene.document.Document</a:t>
+                      </a:r>
+                      <a:endParaRPr lang="de-DE" sz="1600" noProof="0" dirty="0"/>
+                    </a:p>
+                  </a:txBody>
+                  <a:tcPr/>
+                </a:tc>
+                <a:tc>
+                  <a:txBody>
+                    <a:bodyPr/>
+                    <a:lstStyle/>
+                    <a:p>
+                      <a:pPr algn="l"/>
+                      <a:r>
+                        <a:rPr lang="de-DE" sz="1600" noProof="0" dirty="0" smtClean="0"/>
+                        <a:t>Explizit aus Java</a:t>
+                      </a:r>
+                      <a:endParaRPr lang="de-DE" sz="1600" noProof="0" dirty="0"/>
                     </a:p>
                   </a:txBody>
                   <a:tcPr/>
@@ -30476,43 +30548,21 @@
                     <a:lstStyle/>
                     <a:p>
                       <a:r>
-                        <a:rPr lang="de-DE" noProof="0" dirty="0" smtClean="0"/>
-                        <a:t>Java </a:t>
+                        <a:rPr lang="de-DE" sz="1600" noProof="0" dirty="0" smtClean="0"/>
+                        <a:t>Apache </a:t>
+                      </a:r>
+                      <a:br>
+                        <a:rPr lang="de-DE" sz="1600" noProof="0" dirty="0" smtClean="0"/>
+                      </a:br>
+                      <a:r>
+                        <a:rPr lang="de-DE" sz="1600" noProof="0" dirty="0" smtClean="0"/>
+                        <a:t>Lizenz</a:t>
                       </a:r>
                       <a:r>
-                        <a:rPr lang="de-DE" noProof="0" dirty="0" err="1" smtClean="0"/>
-                        <a:t>Document</a:t>
+                        <a:rPr lang="de-DE" sz="1600" baseline="0" noProof="0" dirty="0" smtClean="0"/>
+                        <a:t> 2</a:t>
                       </a:r>
-                      <a:endParaRPr lang="de-DE" noProof="0" dirty="0"/>
-                    </a:p>
-                  </a:txBody>
-                  <a:tcPr/>
-                </a:tc>
-                <a:tc>
-                  <a:txBody>
-                    <a:bodyPr/>
-                    <a:lstStyle/>
-                    <a:p>
-                      <a:pPr algn="ctr"/>
-                      <a:r>
-                        <a:rPr lang="de-DE" noProof="0" dirty="0" smtClean="0"/>
-                        <a:t>Nein</a:t>
-                      </a:r>
-                      <a:endParaRPr lang="de-DE" noProof="0" dirty="0"/>
-                    </a:p>
-                  </a:txBody>
-                  <a:tcPr/>
-                </a:tc>
-                <a:tc>
-                  <a:txBody>
-                    <a:bodyPr/>
-                    <a:lstStyle/>
-                    <a:p>
-                      <a:r>
-                        <a:rPr lang="de-DE" noProof="0" dirty="0" smtClean="0"/>
-                        <a:t>Java</a:t>
-                      </a:r>
-                      <a:endParaRPr lang="de-DE" noProof="0" dirty="0"/>
+                      <a:endParaRPr lang="de-DE" sz="1600" noProof="0" dirty="0"/>
                     </a:p>
                   </a:txBody>
                   <a:tcPr/>
@@ -30549,10 +30599,10 @@
                     <a:p>
                       <a:pPr algn="ctr"/>
                       <a:r>
-                        <a:rPr lang="de-DE" noProof="0" dirty="0" smtClean="0"/>
+                        <a:rPr lang="de-DE" sz="1600" noProof="0" dirty="0" smtClean="0"/>
                         <a:t>Ja</a:t>
                       </a:r>
-                      <a:endParaRPr lang="de-DE" noProof="0" dirty="0"/>
+                      <a:endParaRPr lang="de-DE" sz="1600" noProof="0" dirty="0"/>
                     </a:p>
                   </a:txBody>
                   <a:tcPr/>
@@ -30564,10 +30614,10 @@
                     <a:p>
                       <a:pPr algn="ctr"/>
                       <a:r>
-                        <a:rPr lang="de-DE" noProof="0" dirty="0" smtClean="0"/>
+                        <a:rPr lang="de-DE" sz="1600" noProof="0" dirty="0" smtClean="0"/>
                         <a:t>Java</a:t>
                       </a:r>
-                      <a:endParaRPr lang="de-DE" noProof="0" dirty="0"/>
+                      <a:endParaRPr lang="de-DE" sz="1600" noProof="0" dirty="0"/>
                     </a:p>
                   </a:txBody>
                   <a:tcPr/>
@@ -30578,14 +30628,63 @@
                     <a:lstStyle/>
                     <a:p>
                       <a:r>
-                        <a:rPr lang="de-DE" noProof="0" dirty="0" smtClean="0"/>
-                        <a:t>REST,</a:t>
+                        <a:rPr lang="de-DE" sz="1600" noProof="0" dirty="0" smtClean="0"/>
+                        <a:t>REST API</a:t>
                       </a:r>
                       <a:r>
-                        <a:rPr lang="de-DE" baseline="0" noProof="0" dirty="0" smtClean="0"/>
-                        <a:t> Java</a:t>
+                        <a:rPr lang="de-DE" sz="1600" baseline="0" noProof="0" dirty="0" smtClean="0"/>
+                        <a:t>;</a:t>
                       </a:r>
-                      <a:endParaRPr lang="de-DE" noProof="0" dirty="0"/>
+                      <a:br>
+                        <a:rPr lang="de-DE" sz="1600" baseline="0" noProof="0" dirty="0" smtClean="0"/>
+                      </a:br>
+                      <a:r>
+                        <a:rPr lang="de-DE" sz="1600" baseline="0" noProof="0" dirty="0" smtClean="0"/>
+                        <a:t>Java API</a:t>
+                      </a:r>
+                      <a:endParaRPr lang="de-DE" sz="1600" noProof="0" dirty="0"/>
+                    </a:p>
+                  </a:txBody>
+                  <a:tcPr/>
+                </a:tc>
+                <a:tc>
+                  <a:txBody>
+                    <a:bodyPr/>
+                    <a:lstStyle/>
+                    <a:p>
+                      <a:pPr algn="l"/>
+                      <a:r>
+                        <a:rPr lang="de-DE" sz="1600" noProof="0" dirty="0" smtClean="0"/>
+                        <a:t>XML, JSON, (</a:t>
+                      </a:r>
+                      <a:r>
+                        <a:rPr lang="de-DE" sz="1600" noProof="0" dirty="0" err="1" smtClean="0"/>
+                        <a:t>JavaBIN</a:t>
+                      </a:r>
+                      <a:r>
+                        <a:rPr lang="de-DE" sz="1600" noProof="0" dirty="0" smtClean="0"/>
+                        <a:t>)</a:t>
+                      </a:r>
+                      <a:endParaRPr lang="de-DE" sz="1600" noProof="0" dirty="0"/>
+                    </a:p>
+                  </a:txBody>
+                  <a:tcPr/>
+                </a:tc>
+                <a:tc>
+                  <a:txBody>
+                    <a:bodyPr/>
+                    <a:lstStyle/>
+                    <a:p>
+                      <a:pPr algn="l"/>
+                      <a:r>
+                        <a:rPr lang="de-DE" sz="1600" noProof="0" dirty="0" smtClean="0"/>
+                        <a:t>Explizit über</a:t>
+                      </a:r>
+                      <a:r>
+                        <a:rPr lang="de-DE" sz="1600" baseline="0" noProof="0" dirty="0" smtClean="0"/>
+                        <a:t> REST API oder JDBC Link</a:t>
+                      </a:r>
+                      <a:endParaRPr lang="de-DE" sz="1600" noProof="0" dirty="0"/>
                     </a:p>
                   </a:txBody>
                   <a:tcPr/>
@@ -30596,43 +30695,21 @@
                     <a:lstStyle/>
                     <a:p>
                       <a:r>
-                        <a:rPr lang="de-DE" noProof="0" dirty="0" smtClean="0"/>
-                        <a:t>XML, JSON, </a:t>
+                        <a:rPr lang="de-DE" sz="1600" noProof="0" dirty="0" smtClean="0"/>
+                        <a:t>Apache </a:t>
+                      </a:r>
+                      <a:br>
+                        <a:rPr lang="de-DE" sz="1600" noProof="0" dirty="0" smtClean="0"/>
+                      </a:br>
+                      <a:r>
+                        <a:rPr lang="de-DE" sz="1600" noProof="0" dirty="0" smtClean="0"/>
+                        <a:t>Lizenz</a:t>
                       </a:r>
                       <a:r>
-                        <a:rPr lang="de-DE" noProof="0" dirty="0" err="1" smtClean="0"/>
-                        <a:t>JavaBIN</a:t>
+                        <a:rPr lang="de-DE" sz="1600" baseline="0" noProof="0" dirty="0" smtClean="0"/>
+                        <a:t> 2</a:t>
                       </a:r>
-                      <a:endParaRPr lang="de-DE" noProof="0" dirty="0"/>
-                    </a:p>
-                  </a:txBody>
-                  <a:tcPr/>
-                </a:tc>
-                <a:tc>
-                  <a:txBody>
-                    <a:bodyPr/>
-                    <a:lstStyle/>
-                    <a:p>
-                      <a:pPr algn="ctr"/>
-                      <a:r>
-                        <a:rPr lang="de-DE" noProof="0" dirty="0" smtClean="0"/>
-                        <a:t>Nein</a:t>
-                      </a:r>
-                      <a:endParaRPr lang="de-DE" noProof="0" dirty="0"/>
-                    </a:p>
-                  </a:txBody>
-                  <a:tcPr/>
-                </a:tc>
-                <a:tc>
-                  <a:txBody>
-                    <a:bodyPr/>
-                    <a:lstStyle/>
-                    <a:p>
-                      <a:r>
-                        <a:rPr lang="de-DE" noProof="0" dirty="0" smtClean="0"/>
-                        <a:t>REST, JDBS</a:t>
-                      </a:r>
-                      <a:endParaRPr lang="de-DE" noProof="0" dirty="0"/>
+                      <a:endParaRPr lang="de-DE" sz="1600" noProof="0" dirty="0"/>
                     </a:p>
                   </a:txBody>
                   <a:tcPr/>
@@ -30665,10 +30742,10 @@
                     <a:p>
                       <a:pPr algn="ctr"/>
                       <a:r>
-                        <a:rPr lang="de-DE" noProof="0" dirty="0" smtClean="0"/>
+                        <a:rPr lang="de-DE" sz="1600" noProof="0" dirty="0" smtClean="0"/>
                         <a:t>Ja</a:t>
                       </a:r>
-                      <a:endParaRPr lang="de-DE" noProof="0" dirty="0"/>
+                      <a:endParaRPr lang="de-DE" sz="1600" noProof="0" dirty="0"/>
                     </a:p>
                   </a:txBody>
                   <a:tcPr/>
@@ -30680,10 +30757,10 @@
                     <a:p>
                       <a:pPr algn="ctr"/>
                       <a:r>
-                        <a:rPr lang="de-DE" noProof="0" dirty="0" smtClean="0"/>
-                        <a:t>-</a:t>
+                        <a:rPr lang="de-DE" sz="1600" noProof="0" dirty="0" smtClean="0"/>
+                        <a:t>(WAR Datei)</a:t>
                       </a:r>
-                      <a:endParaRPr lang="de-DE" noProof="0" dirty="0"/>
+                      <a:endParaRPr lang="de-DE" sz="1600" noProof="0" dirty="0"/>
                     </a:p>
                   </a:txBody>
                   <a:tcPr/>
@@ -30694,14 +30771,25 @@
                     <a:lstStyle/>
                     <a:p>
                       <a:r>
-                        <a:rPr lang="de-DE" noProof="0" dirty="0" smtClean="0"/>
-                        <a:t>REST,</a:t>
+                        <a:rPr lang="de-DE" sz="1600" noProof="0" dirty="0" smtClean="0"/>
+                        <a:t>REST API;</a:t>
+                      </a:r>
+                      <a:br>
+                        <a:rPr lang="de-DE" sz="1600" noProof="0" dirty="0" smtClean="0"/>
+                      </a:br>
+                      <a:r>
+                        <a:rPr lang="de-DE" sz="1600" noProof="0" dirty="0" smtClean="0"/>
+                        <a:t>PHP, Ruby, Perl</a:t>
                       </a:r>
                       <a:r>
-                        <a:rPr lang="de-DE" baseline="0" noProof="0" dirty="0" smtClean="0"/>
-                        <a:t> Java </a:t>
+                        <a:rPr lang="de-DE" sz="1600" baseline="0" noProof="0" dirty="0" smtClean="0"/>
+                        <a:t> und</a:t>
                       </a:r>
-                      <a:endParaRPr lang="de-DE" noProof="0" dirty="0"/>
+                      <a:r>
+                        <a:rPr lang="de-DE" sz="1600" noProof="0" dirty="0" smtClean="0"/>
+                        <a:t> C# APIs</a:t>
+                      </a:r>
+                      <a:endParaRPr lang="de-DE" sz="1600" noProof="0" dirty="0"/>
                     </a:p>
                   </a:txBody>
                   <a:tcPr/>
@@ -30711,11 +30799,12 @@
                     <a:bodyPr/>
                     <a:lstStyle/>
                     <a:p>
+                      <a:pPr algn="l"/>
                       <a:r>
-                        <a:rPr lang="de-DE" noProof="0" dirty="0" smtClean="0"/>
+                        <a:rPr lang="de-DE" sz="1600" noProof="0" dirty="0" smtClean="0"/>
                         <a:t>XML, JSON</a:t>
                       </a:r>
-                      <a:endParaRPr lang="de-DE" noProof="0" dirty="0"/>
+                      <a:endParaRPr lang="de-DE" sz="1600" noProof="0" dirty="0"/>
                     </a:p>
                   </a:txBody>
                   <a:tcPr/>
@@ -30725,12 +30814,16 @@
                     <a:bodyPr/>
                     <a:lstStyle/>
                     <a:p>
-                      <a:pPr algn="ctr"/>
+                      <a:pPr algn="l"/>
                       <a:r>
-                        <a:rPr lang="de-DE" noProof="0" dirty="0" smtClean="0"/>
-                        <a:t>Nein</a:t>
+                        <a:rPr lang="de-DE" sz="1600" noProof="0" dirty="0" smtClean="0"/>
+                        <a:t>Explizit über REST API oder implizit</a:t>
                       </a:r>
-                      <a:endParaRPr lang="de-DE" noProof="0" dirty="0"/>
+                      <a:r>
+                        <a:rPr lang="de-DE" sz="1600" baseline="0" noProof="0" dirty="0" smtClean="0"/>
+                        <a:t> über einen Crawler</a:t>
+                      </a:r>
+                      <a:endParaRPr lang="de-DE" sz="1600" noProof="0" dirty="0"/>
                     </a:p>
                   </a:txBody>
                   <a:tcPr/>
@@ -30740,11 +30833,12 @@
                     <a:bodyPr/>
                     <a:lstStyle/>
                     <a:p>
+                      <a:pPr algn="l"/>
                       <a:r>
-                        <a:rPr lang="de-DE" noProof="0" dirty="0" smtClean="0"/>
-                        <a:t>REST, JDBC, File System, SAMBA, FTP</a:t>
+                        <a:rPr lang="de-DE" sz="1600" noProof="0" dirty="0" smtClean="0"/>
+                        <a:t>GNU GPL 3</a:t>
                       </a:r>
-                      <a:endParaRPr lang="de-DE" noProof="0" dirty="0"/>
+                      <a:endParaRPr lang="de-DE" sz="1600" noProof="0" dirty="0"/>
                     </a:p>
                   </a:txBody>
                   <a:tcPr/>
@@ -30781,10 +30875,10 @@
                     <a:p>
                       <a:pPr algn="ctr"/>
                       <a:r>
-                        <a:rPr lang="de-DE" noProof="0" dirty="0" smtClean="0"/>
+                        <a:rPr lang="de-DE" sz="1600" noProof="0" dirty="0" smtClean="0"/>
                         <a:t>Ja</a:t>
                       </a:r>
-                      <a:endParaRPr lang="de-DE" noProof="0" dirty="0"/>
+                      <a:endParaRPr lang="de-DE" sz="1600" noProof="0" dirty="0"/>
                     </a:p>
                   </a:txBody>
                   <a:tcPr/>
@@ -30796,10 +30890,10 @@
                     <a:p>
                       <a:pPr algn="ctr"/>
                       <a:r>
-                        <a:rPr lang="de-DE" noProof="0" dirty="0" smtClean="0"/>
-                        <a:t>Java</a:t>
+                        <a:rPr lang="de-DE" sz="1600" noProof="0" dirty="0" smtClean="0"/>
+                        <a:t>Nein</a:t>
                       </a:r>
-                      <a:endParaRPr lang="de-DE" noProof="0" dirty="0"/>
+                      <a:endParaRPr lang="de-DE" sz="1600" noProof="0" dirty="0"/>
                     </a:p>
                   </a:txBody>
                   <a:tcPr/>
@@ -30810,10 +30904,14 @@
                     <a:lstStyle/>
                     <a:p>
                       <a:r>
-                        <a:rPr lang="de-DE" noProof="0" dirty="0" smtClean="0"/>
-                        <a:t>REST</a:t>
+                        <a:rPr lang="de-DE" sz="1600" noProof="0" dirty="0" err="1" smtClean="0"/>
+                        <a:t>RESTful</a:t>
                       </a:r>
-                      <a:endParaRPr lang="de-DE" noProof="0" dirty="0"/>
+                      <a:r>
+                        <a:rPr lang="de-DE" sz="1600" noProof="0" dirty="0" smtClean="0"/>
+                        <a:t> API</a:t>
+                      </a:r>
+                      <a:endParaRPr lang="de-DE" sz="1600" noProof="0" dirty="0"/>
                     </a:p>
                   </a:txBody>
                   <a:tcPr/>
@@ -30823,11 +30921,12 @@
                     <a:bodyPr/>
                     <a:lstStyle/>
                     <a:p>
+                      <a:pPr algn="l"/>
                       <a:r>
-                        <a:rPr lang="de-DE" noProof="0" dirty="0" smtClean="0"/>
+                        <a:rPr lang="de-DE" sz="1600" noProof="0" dirty="0" smtClean="0"/>
                         <a:t>JSON</a:t>
                       </a:r>
-                      <a:endParaRPr lang="de-DE" noProof="0" dirty="0"/>
+                      <a:endParaRPr lang="de-DE" sz="1600" noProof="0" dirty="0"/>
                     </a:p>
                   </a:txBody>
                   <a:tcPr/>
@@ -30837,12 +30936,24 @@
                     <a:bodyPr/>
                     <a:lstStyle/>
                     <a:p>
-                      <a:pPr algn="ctr"/>
+                      <a:pPr algn="l"/>
                       <a:r>
-                        <a:rPr lang="de-DE" noProof="0" dirty="0" smtClean="0"/>
-                        <a:t>Nein</a:t>
+                        <a:rPr lang="de-DE" sz="1600" noProof="0" dirty="0" smtClean="0"/>
+                        <a:t>Explizit</a:t>
                       </a:r>
-                      <a:endParaRPr lang="de-DE" noProof="0" dirty="0"/>
+                      <a:r>
+                        <a:rPr lang="de-DE" sz="1600" baseline="0" noProof="0" dirty="0" smtClean="0"/>
+                        <a:t> über </a:t>
+                      </a:r>
+                      <a:r>
+                        <a:rPr lang="de-DE" sz="1600" baseline="0" noProof="0" dirty="0" err="1" smtClean="0"/>
+                        <a:t>RESTful</a:t>
+                      </a:r>
+                      <a:r>
+                        <a:rPr lang="de-DE" sz="1600" baseline="0" noProof="0" dirty="0" smtClean="0"/>
+                        <a:t> API</a:t>
+                      </a:r>
+                      <a:endParaRPr lang="de-DE" sz="1600" noProof="0" dirty="0"/>
                     </a:p>
                   </a:txBody>
                   <a:tcPr/>
@@ -30852,11 +30963,23 @@
                     <a:bodyPr/>
                     <a:lstStyle/>
                     <a:p>
+                      <a:pPr algn="l"/>
                       <a:r>
-                        <a:rPr lang="de-DE" noProof="0" dirty="0" smtClean="0"/>
-                        <a:t>REST-API</a:t>
+                        <a:rPr lang="de-DE" sz="1600" noProof="0" dirty="0" smtClean="0"/>
+                        <a:t>Apache </a:t>
                       </a:r>
-                      <a:endParaRPr lang="de-DE" noProof="0" dirty="0"/>
+                      <a:br>
+                        <a:rPr lang="de-DE" sz="1600" noProof="0" dirty="0" smtClean="0"/>
+                      </a:br>
+                      <a:r>
+                        <a:rPr lang="de-DE" sz="1600" noProof="0" dirty="0" smtClean="0"/>
+                        <a:t>Lizenz</a:t>
+                      </a:r>
+                      <a:r>
+                        <a:rPr lang="de-DE" sz="1600" baseline="0" noProof="0" dirty="0" smtClean="0"/>
+                        <a:t> 2</a:t>
+                      </a:r>
+                      <a:endParaRPr lang="de-DE" sz="1600" noProof="0" dirty="0"/>
                     </a:p>
                   </a:txBody>
                   <a:tcPr/>
@@ -30902,7 +31025,7 @@
         </p:nvSpPr>
         <p:spPr>
           <a:xfrm>
-            <a:off x="9935112" y="3091697"/>
+            <a:off x="9935112" y="2815589"/>
             <a:ext cx="1536888" cy="646331"/>
           </a:xfrm>
           <a:prstGeom prst="rect">
@@ -30932,7 +31055,7 @@
         </p:nvSpPr>
         <p:spPr>
           <a:xfrm>
-            <a:off x="9935112" y="5423419"/>
+            <a:off x="9935111" y="5978307"/>
             <a:ext cx="1945650" cy="646331"/>
           </a:xfrm>
           <a:prstGeom prst="rect">
@@ -30956,18 +31079,26 @@
       </p:sp>
       <p:sp>
         <p:nvSpPr>
-          <p:cNvPr id="10" name="Rechteck 9"/>
+          <p:cNvPr id="3" name="Rechteck 2"/>
           <p:cNvSpPr/>
           <p:nvPr/>
         </p:nvSpPr>
         <p:spPr>
           <a:xfrm>
-            <a:off x="729466" y="3327531"/>
-            <a:ext cx="9000000" cy="180000"/>
+            <a:off x="538235" y="2681555"/>
+            <a:ext cx="9396877" cy="914400"/>
           </a:xfrm>
           <a:prstGeom prst="rect">
             <a:avLst/>
           </a:prstGeom>
+          <a:solidFill>
+            <a:srgbClr val="000000">
+              <a:alpha val="50196"/>
+            </a:srgbClr>
+          </a:solidFill>
+          <a:ln>
+            <a:noFill/>
+          </a:ln>
         </p:spPr>
         <p:style>
           <a:lnRef idx="2">
@@ -30996,18 +31127,26 @@
       </p:sp>
       <p:sp>
         <p:nvSpPr>
-          <p:cNvPr id="11" name="Rechteck 10"/>
+          <p:cNvPr id="12" name="Rechteck 11"/>
           <p:cNvSpPr/>
           <p:nvPr/>
         </p:nvSpPr>
         <p:spPr>
           <a:xfrm>
-            <a:off x="729466" y="5656584"/>
-            <a:ext cx="9000000" cy="180000"/>
+            <a:off x="538234" y="5979560"/>
+            <a:ext cx="9396877" cy="645078"/>
           </a:xfrm>
           <a:prstGeom prst="rect">
             <a:avLst/>
           </a:prstGeom>
+          <a:solidFill>
+            <a:srgbClr val="000000">
+              <a:alpha val="50196"/>
+            </a:srgbClr>
+          </a:solidFill>
+          <a:ln>
+            <a:noFill/>
+          </a:ln>
         </p:spPr>
         <p:style>
           <a:lnRef idx="2">
@@ -31056,6 +31195,9 @@
                     <p:cTn id="3" fill="hold">
                       <p:stCondLst>
                         <p:cond delay="indefinite"/>
+                        <p:cond evt="onBegin" delay="0">
+                          <p:tn val="2"/>
+                        </p:cond>
                       </p:stCondLst>
                       <p:childTnLst>
                         <p:par>
@@ -31065,7 +31207,7 @@
                             </p:stCondLst>
                             <p:childTnLst>
                               <p:par>
-                                <p:cTn id="5" presetID="1" presetClass="entr" presetSubtype="0" fill="hold" grpId="0" nodeType="clickEffect">
+                                <p:cTn id="5" presetID="1" presetClass="entr" presetSubtype="0" fill="hold" grpId="0" nodeType="withEffect">
                                   <p:stCondLst>
                                     <p:cond delay="0"/>
                                   </p:stCondLst>
@@ -31078,7 +31220,7 @@
                                           </p:stCondLst>
                                         </p:cTn>
                                         <p:tgtEl>
-                                          <p:spTgt spid="10"/>
+                                          <p:spTgt spid="8"/>
                                         </p:tgtEl>
                                         <p:attrNameLst>
                                           <p:attrName>style.visibility</p:attrName>
@@ -31100,60 +31242,6 @@
                                     <p:set>
                                       <p:cBhvr>
                                         <p:cTn id="8" dur="1" fill="hold">
-                                          <p:stCondLst>
-                                            <p:cond delay="0"/>
-                                          </p:stCondLst>
-                                        </p:cTn>
-                                        <p:tgtEl>
-                                          <p:spTgt spid="11"/>
-                                        </p:tgtEl>
-                                        <p:attrNameLst>
-                                          <p:attrName>style.visibility</p:attrName>
-                                        </p:attrNameLst>
-                                      </p:cBhvr>
-                                      <p:to>
-                                        <p:strVal val="visible"/>
-                                      </p:to>
-                                    </p:set>
-                                  </p:childTnLst>
-                                </p:cTn>
-                              </p:par>
-                              <p:par>
-                                <p:cTn id="9" presetID="1" presetClass="entr" presetSubtype="0" fill="hold" grpId="0" nodeType="withEffect">
-                                  <p:stCondLst>
-                                    <p:cond delay="0"/>
-                                  </p:stCondLst>
-                                  <p:childTnLst>
-                                    <p:set>
-                                      <p:cBhvr>
-                                        <p:cTn id="10" dur="1" fill="hold">
-                                          <p:stCondLst>
-                                            <p:cond delay="0"/>
-                                          </p:stCondLst>
-                                        </p:cTn>
-                                        <p:tgtEl>
-                                          <p:spTgt spid="8"/>
-                                        </p:tgtEl>
-                                        <p:attrNameLst>
-                                          <p:attrName>style.visibility</p:attrName>
-                                        </p:attrNameLst>
-                                      </p:cBhvr>
-                                      <p:to>
-                                        <p:strVal val="visible"/>
-                                      </p:to>
-                                    </p:set>
-                                  </p:childTnLst>
-                                </p:cTn>
-                              </p:par>
-                              <p:par>
-                                <p:cTn id="11" presetID="1" presetClass="entr" presetSubtype="0" fill="hold" grpId="0" nodeType="withEffect">
-                                  <p:stCondLst>
-                                    <p:cond delay="0"/>
-                                  </p:stCondLst>
-                                  <p:childTnLst>
-                                    <p:set>
-                                      <p:cBhvr>
-                                        <p:cTn id="12" dur="1" fill="hold">
                                           <p:stCondLst>
                                             <p:cond delay="0"/>
                                           </p:stCondLst>
@@ -31202,8 +31290,6 @@
     <p:bldLst>
       <p:bldP spid="8" grpId="0"/>
       <p:bldP spid="9" grpId="0"/>
-      <p:bldP spid="10" grpId="0" animBg="1"/>
-      <p:bldP spid="11" grpId="0" animBg="1"/>
     </p:bldLst>
   </p:timing>
 </p:sld>
@@ -31289,7 +31375,7 @@
             <p:ph idx="1"/>
             <p:extLst>
               <p:ext uri="{D42A27DB-BD31-4B8C-83A1-F6EECF244321}">
-                <p14:modId xmlns:p14="http://schemas.microsoft.com/office/powerpoint/2010/main" val="4065030"/>
+                <p14:modId xmlns:p14="http://schemas.microsoft.com/office/powerpoint/2010/main" val="3031841225"/>
               </p:ext>
             </p:extLst>
           </p:nvPr>
@@ -31347,17 +31433,27 @@
                     <a:bodyPr/>
                     <a:lstStyle/>
                     <a:p>
-                      <a:pPr algn="l" fontAlgn="b"/>
-                      <a:endParaRPr lang="en-US" sz="1800" b="0" i="0" u="none" strike="noStrike" dirty="0">
+                      <a:pPr algn="ctr" fontAlgn="b"/>
+                      <a:r>
+                        <a:rPr lang="en-US" sz="1800" b="1" i="0" u="none" strike="noStrike" dirty="0" err="1" smtClean="0">
+                          <a:solidFill>
+                            <a:schemeClr val="tx1"/>
+                          </a:solidFill>
+                          <a:effectLst/>
+                          <a:latin typeface="+mn-lt"/>
+                        </a:rPr>
+                        <a:t>min:sec:ms</a:t>
+                      </a:r>
+                      <a:endParaRPr lang="en-US" sz="1800" b="1" i="0" u="none" strike="noStrike" dirty="0">
                         <a:solidFill>
-                          <a:srgbClr val="000000"/>
+                          <a:schemeClr val="tx1"/>
                         </a:solidFill>
                         <a:effectLst/>
                         <a:latin typeface="+mn-lt"/>
                       </a:endParaRPr>
                     </a:p>
                   </a:txBody>
-                  <a:tcPr marL="9525" marR="9525" marT="9525" marB="0" anchor="b"/>
+                  <a:tcPr marL="9525" marR="9525" marT="9525" marB="0" anchor="ctr"/>
                 </a:tc>
                 <a:tc>
                   <a:txBody>
@@ -31578,6 +31674,16 @@
                     <a:p>
                       <a:pPr algn="l" fontAlgn="b"/>
                       <a:r>
+                        <a:rPr lang="en-US" sz="1800" b="1" i="0" u="none" strike="noStrike" dirty="0" smtClean="0">
+                          <a:solidFill>
+                            <a:srgbClr val="000000"/>
+                          </a:solidFill>
+                          <a:effectLst/>
+                          <a:latin typeface="+mn-lt"/>
+                        </a:rPr>
+                        <a:t> Open </a:t>
+                      </a:r>
+                      <a:r>
                         <a:rPr lang="en-US" sz="1800" b="1" i="0" u="none" strike="noStrike" dirty="0">
                           <a:solidFill>
                             <a:srgbClr val="000000"/>
@@ -31585,8 +31691,54 @@
                           <a:effectLst/>
                           <a:latin typeface="+mn-lt"/>
                         </a:rPr>
-                        <a:t>Open Search Server</a:t>
+                        <a:t>Search </a:t>
                       </a:r>
+                      <a:r>
+                        <a:rPr lang="en-US" sz="1800" b="1" i="0" u="none" strike="noStrike" dirty="0" smtClean="0">
+                          <a:solidFill>
+                            <a:srgbClr val="000000"/>
+                          </a:solidFill>
+                          <a:effectLst/>
+                          <a:latin typeface="+mn-lt"/>
+                        </a:rPr>
+                        <a:t/>
+                      </a:r>
+                      <a:br>
+                        <a:rPr lang="en-US" sz="1800" b="1" i="0" u="none" strike="noStrike" dirty="0" smtClean="0">
+                          <a:solidFill>
+                            <a:srgbClr val="000000"/>
+                          </a:solidFill>
+                          <a:effectLst/>
+                          <a:latin typeface="+mn-lt"/>
+                        </a:rPr>
+                      </a:br>
+                      <a:r>
+                        <a:rPr lang="en-US" sz="1800" b="1" i="0" u="none" strike="noStrike" baseline="0" dirty="0" smtClean="0">
+                          <a:solidFill>
+                            <a:srgbClr val="000000"/>
+                          </a:solidFill>
+                          <a:effectLst/>
+                          <a:latin typeface="+mn-lt"/>
+                        </a:rPr>
+                        <a:t> </a:t>
+                      </a:r>
+                      <a:r>
+                        <a:rPr lang="en-US" sz="1800" b="1" i="0" u="none" strike="noStrike" dirty="0" smtClean="0">
+                          <a:solidFill>
+                            <a:srgbClr val="000000"/>
+                          </a:solidFill>
+                          <a:effectLst/>
+                          <a:latin typeface="+mn-lt"/>
+                        </a:rPr>
+                        <a:t>Server</a:t>
+                      </a:r>
+                      <a:endParaRPr lang="en-US" sz="1800" b="1" i="0" u="none" strike="noStrike" dirty="0">
+                        <a:solidFill>
+                          <a:srgbClr val="000000"/>
+                        </a:solidFill>
+                        <a:effectLst/>
+                        <a:latin typeface="+mn-lt"/>
+                      </a:endParaRPr>
                     </a:p>
                   </a:txBody>
                   <a:tcPr marL="9525" marR="9525" marT="9525" marB="0" anchor="ctr"/>
@@ -31598,7 +31750,7 @@
                     <a:p>
                       <a:pPr algn="ctr" fontAlgn="b"/>
                       <a:r>
-                        <a:rPr lang="en-US" sz="1800" b="0" i="0" u="none" strike="noStrike" dirty="0">
+                        <a:rPr lang="en-US" sz="1800" b="0" i="0" u="none" strike="noStrike" dirty="0" smtClean="0">
                           <a:solidFill>
                             <a:srgbClr val="000000"/>
                           </a:solidFill>
@@ -31607,6 +31759,13 @@
                         </a:rPr>
                         <a:t>00:05:22</a:t>
                       </a:r>
+                      <a:endParaRPr lang="en-US" sz="1800" b="0" i="0" u="none" strike="noStrike" dirty="0">
+                        <a:solidFill>
+                          <a:srgbClr val="000000"/>
+                        </a:solidFill>
+                        <a:effectLst/>
+                        <a:latin typeface="+mn-lt"/>
+                      </a:endParaRPr>
                     </a:p>
                   </a:txBody>
                   <a:tcPr marL="9525" marR="9525" marT="9525" marB="0" anchor="ctr"/>
@@ -31692,7 +31851,7 @@
                           <a:effectLst/>
                           <a:latin typeface="+mn-lt"/>
                         </a:rPr>
-                        <a:t>Apache </a:t>
+                        <a:t> Apache </a:t>
                       </a:r>
                       <a:r>
                         <a:rPr lang="en-US" sz="1800" b="1" i="0" u="none" strike="noStrike" dirty="0" err="1" smtClean="0">
@@ -31817,19 +31976,23 @@
       </p:graphicFrame>
       <p:sp>
         <p:nvSpPr>
-          <p:cNvPr id="9" name="Textfeld 8"/>
+          <p:cNvPr id="3" name="Textfeld 2"/>
           <p:cNvSpPr txBox="1"/>
           <p:nvPr/>
         </p:nvSpPr>
         <p:spPr>
           <a:xfrm>
-            <a:off x="7151906" y="5145612"/>
-            <a:ext cx="4593054" cy="923330"/>
+            <a:off x="2856216" y="5074418"/>
+            <a:ext cx="6544638" cy="1477328"/>
           </a:xfrm>
           <a:prstGeom prst="rect">
             <a:avLst/>
           </a:prstGeom>
-          <a:noFill/>
+          <a:solidFill>
+            <a:srgbClr val="000000">
+              <a:alpha val="50196"/>
+            </a:srgbClr>
+          </a:solidFill>
         </p:spPr>
         <p:txBody>
           <a:bodyPr wrap="square" rtlCol="0">
@@ -31837,32 +32000,110 @@
           </a:bodyPr>
           <a:lstStyle/>
           <a:p>
-            <a:pPr defTabSz="360363"/>
+            <a:pPr algn="just"/>
+            <a:r>
+              <a:rPr lang="en-US" b="1" dirty="0" err="1" smtClean="0"/>
+              <a:t>Ergebnis</a:t>
+            </a:r>
+            <a:r>
+              <a:rPr lang="en-US" b="1" dirty="0" smtClean="0"/>
+              <a:t>:</a:t>
+            </a:r>
             <a:r>
               <a:rPr lang="en-US" dirty="0" smtClean="0"/>
-              <a:t> 12 MB PDF		 - Spring Data Book</a:t>
-            </a:r>
-            <a:br>
-              <a:rPr lang="en-US" dirty="0" smtClean="0"/>
-            </a:br>
-            <a:r>
-              <a:rPr lang="en-US" dirty="0" smtClean="0"/>
-              <a:t>520 KB PDF		 - </a:t>
+              <a:t> </a:t>
             </a:r>
             <a:r>
               <a:rPr lang="en-US" dirty="0" err="1" smtClean="0"/>
-              <a:t>Desinfect</a:t>
+              <a:t>Beide</a:t>
             </a:r>
             <a:r>
               <a:rPr lang="en-US" dirty="0" smtClean="0"/>
-              <a:t> Article</a:t>
+              <a:t> </a:t>
             </a:r>
-            <a:br>
-              <a:rPr lang="en-US" dirty="0" smtClean="0"/>
-            </a:br>
+            <a:r>
+              <a:rPr lang="en-US" dirty="0" err="1" smtClean="0"/>
+              <a:t>Technologien</a:t>
+            </a:r>
             <a:r>
               <a:rPr lang="en-US" dirty="0" smtClean="0"/>
-              <a:t>  78 KB DOCX	 - Lorem Ipsum</a:t>
+              <a:t> </a:t>
+            </a:r>
+            <a:r>
+              <a:rPr lang="en-US" dirty="0" err="1" smtClean="0"/>
+              <a:t>indizieren</a:t>
+            </a:r>
+            <a:r>
+              <a:rPr lang="en-US" dirty="0" smtClean="0"/>
+              <a:t> </a:t>
+            </a:r>
+            <a:r>
+              <a:rPr lang="en-US" dirty="0" err="1" smtClean="0"/>
+              <a:t>schnell</a:t>
+            </a:r>
+            <a:r>
+              <a:rPr lang="en-US" dirty="0" smtClean="0"/>
+              <a:t> </a:t>
+            </a:r>
+            <a:r>
+              <a:rPr lang="en-US" dirty="0" err="1" smtClean="0"/>
+              <a:t>genug</a:t>
+            </a:r>
+            <a:r>
+              <a:rPr lang="en-US" dirty="0" smtClean="0"/>
+              <a:t> f</a:t>
+            </a:r>
+            <a:r>
+              <a:rPr lang="de-DE" dirty="0" err="1" smtClean="0"/>
+              <a:t>ür</a:t>
+            </a:r>
+            <a:r>
+              <a:rPr lang="de-DE" dirty="0" smtClean="0"/>
+              <a:t> den Knowledge Base Projekt-Kontext. Da beide im Kern die selbe Search Engine </a:t>
+            </a:r>
+            <a:r>
+              <a:rPr lang="de-DE" dirty="0" err="1" smtClean="0"/>
+              <a:t>verweden</a:t>
+            </a:r>
+            <a:r>
+              <a:rPr lang="de-DE" dirty="0" smtClean="0"/>
+              <a:t> (Apache </a:t>
+            </a:r>
+            <a:r>
+              <a:rPr lang="de-DE" dirty="0" err="1" smtClean="0"/>
+              <a:t>Lucene</a:t>
+            </a:r>
+            <a:r>
+              <a:rPr lang="de-DE" dirty="0" smtClean="0"/>
+              <a:t>) ist der Performance-Unterschied wohl hauptsächlich auf den Dokument-Parser</a:t>
+            </a:r>
+            <a:r>
+              <a:rPr lang="en-US" dirty="0" smtClean="0"/>
+              <a:t> </a:t>
+            </a:r>
+            <a:r>
+              <a:rPr lang="en-US" dirty="0" err="1" smtClean="0"/>
+              <a:t>zurück</a:t>
+            </a:r>
+            <a:r>
+              <a:rPr lang="en-US" dirty="0" smtClean="0"/>
+              <a:t> </a:t>
+            </a:r>
+            <a:r>
+              <a:rPr lang="en-US" dirty="0" err="1" smtClean="0"/>
+              <a:t>zu</a:t>
+            </a:r>
+            <a:r>
+              <a:rPr lang="en-US" dirty="0" smtClean="0"/>
+              <a:t> </a:t>
+            </a:r>
+            <a:r>
+              <a:rPr lang="en-US" dirty="0" err="1" smtClean="0"/>
+              <a:t>führen</a:t>
+            </a:r>
+            <a:r>
+              <a:rPr lang="en-US" dirty="0" smtClean="0"/>
+              <a:t>.</a:t>
             </a:r>
             <a:endParaRPr lang="en-US" dirty="0"/>
           </a:p>
@@ -32094,7 +32335,6 @@
               <a:rPr lang="en-US" dirty="0"/>
               <a:t>System</a:t>
             </a:r>
-            <a:endParaRPr lang="en-US" dirty="0"/>
           </a:p>
         </p:txBody>
       </p:sp>
@@ -32667,6 +32907,202 @@
           </a:fontRef>
         </p:style>
       </p:cxnSp>
+      <p:sp>
+        <p:nvSpPr>
+          <p:cNvPr id="12" name="Rechteckige Legende 11"/>
+          <p:cNvSpPr/>
+          <p:nvPr/>
+        </p:nvSpPr>
+        <p:spPr>
+          <a:xfrm>
+            <a:off x="1713166" y="1419780"/>
+            <a:ext cx="1923885" cy="758341"/>
+          </a:xfrm>
+          <a:prstGeom prst="wedgeRectCallout">
+            <a:avLst>
+              <a:gd name="adj1" fmla="val -27343"/>
+              <a:gd name="adj2" fmla="val 148959"/>
+            </a:avLst>
+          </a:prstGeom>
+        </p:spPr>
+        <p:style>
+          <a:lnRef idx="2">
+            <a:schemeClr val="accent6">
+              <a:shade val="50000"/>
+            </a:schemeClr>
+          </a:lnRef>
+          <a:fillRef idx="1">
+            <a:schemeClr val="accent6"/>
+          </a:fillRef>
+          <a:effectRef idx="0">
+            <a:schemeClr val="accent6"/>
+          </a:effectRef>
+          <a:fontRef idx="minor">
+            <a:schemeClr val="lt1"/>
+          </a:fontRef>
+        </p:style>
+        <p:txBody>
+          <a:bodyPr rtlCol="0" anchor="ctr"/>
+          <a:lstStyle/>
+          <a:p>
+            <a:pPr algn="ctr"/>
+            <a:r>
+              <a:rPr lang="de-DE" sz="1400" dirty="0" smtClean="0"/>
+              <a:t>Liefert statische Inhalte (z.B. HTML, CSS)</a:t>
+            </a:r>
+            <a:endParaRPr lang="en-US" sz="1400" dirty="0"/>
+          </a:p>
+        </p:txBody>
+      </p:sp>
+      <p:sp>
+        <p:nvSpPr>
+          <p:cNvPr id="23" name="Rechteckige Legende 22"/>
+          <p:cNvSpPr/>
+          <p:nvPr/>
+        </p:nvSpPr>
+        <p:spPr>
+          <a:xfrm>
+            <a:off x="1186247" y="6038278"/>
+            <a:ext cx="1923885" cy="758341"/>
+          </a:xfrm>
+          <a:prstGeom prst="wedgeRectCallout">
+            <a:avLst>
+              <a:gd name="adj1" fmla="val -27343"/>
+              <a:gd name="adj2" fmla="val -80006"/>
+            </a:avLst>
+          </a:prstGeom>
+        </p:spPr>
+        <p:style>
+          <a:lnRef idx="2">
+            <a:schemeClr val="accent6">
+              <a:shade val="50000"/>
+            </a:schemeClr>
+          </a:lnRef>
+          <a:fillRef idx="1">
+            <a:schemeClr val="accent6"/>
+          </a:fillRef>
+          <a:effectRef idx="0">
+            <a:schemeClr val="accent6"/>
+          </a:effectRef>
+          <a:fontRef idx="minor">
+            <a:schemeClr val="lt1"/>
+          </a:fontRef>
+        </p:style>
+        <p:txBody>
+          <a:bodyPr rtlCol="0" anchor="ctr"/>
+          <a:lstStyle/>
+          <a:p>
+            <a:pPr algn="ctr"/>
+            <a:r>
+              <a:rPr lang="de-DE" sz="1400" dirty="0" smtClean="0"/>
+              <a:t>Ablage für Dateien (HTML, CSS, JS, JPG, PDF, DOC, etc.)</a:t>
+            </a:r>
+            <a:endParaRPr lang="en-US" sz="1400" dirty="0"/>
+          </a:p>
+        </p:txBody>
+      </p:sp>
+      <p:sp>
+        <p:nvSpPr>
+          <p:cNvPr id="24" name="Rechteckige Legende 23"/>
+          <p:cNvSpPr/>
+          <p:nvPr/>
+        </p:nvSpPr>
+        <p:spPr>
+          <a:xfrm>
+            <a:off x="3975193" y="6038277"/>
+            <a:ext cx="2558847" cy="758341"/>
+          </a:xfrm>
+          <a:prstGeom prst="wedgeRectCallout">
+            <a:avLst>
+              <a:gd name="adj1" fmla="val -16502"/>
+              <a:gd name="adj2" fmla="val -77296"/>
+            </a:avLst>
+          </a:prstGeom>
+        </p:spPr>
+        <p:style>
+          <a:lnRef idx="2">
+            <a:schemeClr val="accent6">
+              <a:shade val="50000"/>
+            </a:schemeClr>
+          </a:lnRef>
+          <a:fillRef idx="1">
+            <a:schemeClr val="accent6"/>
+          </a:fillRef>
+          <a:effectRef idx="0">
+            <a:schemeClr val="accent6"/>
+          </a:effectRef>
+          <a:fontRef idx="minor">
+            <a:schemeClr val="lt1"/>
+          </a:fontRef>
+        </p:style>
+        <p:txBody>
+          <a:bodyPr rtlCol="0" anchor="ctr"/>
+          <a:lstStyle/>
+          <a:p>
+            <a:pPr algn="ctr"/>
+            <a:r>
+              <a:rPr lang="de-DE" sz="1400" dirty="0" smtClean="0"/>
+              <a:t>Ablage für Meta-Informationen (Autor, Pfad, Datum, Version, etc.)</a:t>
+            </a:r>
+            <a:endParaRPr lang="en-US" sz="1400" dirty="0"/>
+          </a:p>
+        </p:txBody>
+      </p:sp>
+      <p:sp>
+        <p:nvSpPr>
+          <p:cNvPr id="25" name="Rechteckige Legende 24"/>
+          <p:cNvSpPr/>
+          <p:nvPr/>
+        </p:nvSpPr>
+        <p:spPr>
+          <a:xfrm>
+            <a:off x="4072390" y="1410476"/>
+            <a:ext cx="1923885" cy="758341"/>
+          </a:xfrm>
+          <a:prstGeom prst="wedgeRectCallout">
+            <a:avLst>
+              <a:gd name="adj1" fmla="val -26275"/>
+              <a:gd name="adj2" fmla="val 150314"/>
+            </a:avLst>
+          </a:prstGeom>
+        </p:spPr>
+        <p:style>
+          <a:lnRef idx="2">
+            <a:schemeClr val="accent6">
+              <a:shade val="50000"/>
+            </a:schemeClr>
+          </a:lnRef>
+          <a:fillRef idx="1">
+            <a:schemeClr val="accent6"/>
+          </a:fillRef>
+          <a:effectRef idx="0">
+            <a:schemeClr val="accent6"/>
+          </a:effectRef>
+          <a:fontRef idx="minor">
+            <a:schemeClr val="lt1"/>
+          </a:fontRef>
+        </p:style>
+        <p:txBody>
+          <a:bodyPr rtlCol="0" anchor="ctr"/>
+          <a:lstStyle/>
+          <a:p>
+            <a:pPr algn="ctr"/>
+            <a:r>
+              <a:rPr lang="de-DE" sz="1400" dirty="0" smtClean="0"/>
+              <a:t>Liefert dynamische Inhalte (z.B. AJAX-</a:t>
+            </a:r>
+            <a:r>
+              <a:rPr lang="de-DE" sz="1400" dirty="0" err="1" smtClean="0"/>
+              <a:t>Requests</a:t>
+            </a:r>
+            <a:r>
+              <a:rPr lang="de-DE" sz="1400" dirty="0" smtClean="0"/>
+              <a:t>)</a:t>
+            </a:r>
+            <a:endParaRPr lang="en-US" sz="1400" dirty="0"/>
+          </a:p>
+        </p:txBody>
+      </p:sp>
     </p:spTree>
     <p:extLst>
       <p:ext uri="{BB962C8B-B14F-4D97-AF65-F5344CB8AC3E}">
@@ -32891,7 +33327,6 @@
               <a:rPr lang="en-US" dirty="0"/>
               <a:t>System</a:t>
             </a:r>
-            <a:endParaRPr lang="en-US" dirty="0"/>
           </a:p>
         </p:txBody>
       </p:sp>
@@ -33651,6 +34086,713 @@
 </file>
 
 <file path=ppt/slides/slide15.xml><?xml version="1.0" encoding="utf-8"?>
+<p:sld xmlns:a="http://schemas.openxmlformats.org/drawingml/2006/main" xmlns:r="http://schemas.openxmlformats.org/officeDocument/2006/relationships" xmlns:p="http://schemas.openxmlformats.org/presentationml/2006/main">
+  <p:cSld>
+    <p:spTree>
+      <p:nvGrpSpPr>
+        <p:cNvPr id="1" name=""/>
+        <p:cNvGrpSpPr/>
+        <p:nvPr/>
+      </p:nvGrpSpPr>
+      <p:grpSpPr>
+        <a:xfrm>
+          <a:off x="0" y="0"/>
+          <a:ext cx="0" cy="0"/>
+          <a:chOff x="0" y="0"/>
+          <a:chExt cx="0" cy="0"/>
+        </a:xfrm>
+      </p:grpSpPr>
+      <p:sp>
+        <p:nvSpPr>
+          <p:cNvPr id="2" name="Titel 1"/>
+          <p:cNvSpPr>
+            <a:spLocks noGrp="1"/>
+          </p:cNvSpPr>
+          <p:nvPr>
+            <p:ph type="title"/>
+          </p:nvPr>
+        </p:nvSpPr>
+        <p:spPr/>
+        <p:txBody>
+          <a:bodyPr/>
+          <a:lstStyle/>
+          <a:p>
+            <a:r>
+              <a:rPr lang="en-US" dirty="0" err="1" smtClean="0"/>
+              <a:t>Technologie-Auswahl</a:t>
+            </a:r>
+            <a:r>
+              <a:rPr lang="en-US" dirty="0" smtClean="0"/>
+              <a:t/>
+            </a:r>
+            <a:br>
+              <a:rPr lang="en-US" dirty="0" smtClean="0"/>
+            </a:br>
+            <a:r>
+              <a:rPr lang="en-US" dirty="0" smtClean="0"/>
+              <a:t>Rationale</a:t>
+            </a:r>
+            <a:endParaRPr lang="en-US" dirty="0"/>
+          </a:p>
+        </p:txBody>
+      </p:sp>
+      <p:sp>
+        <p:nvSpPr>
+          <p:cNvPr id="4" name="Foliennummernplatzhalter 3"/>
+          <p:cNvSpPr>
+            <a:spLocks noGrp="1"/>
+          </p:cNvSpPr>
+          <p:nvPr>
+            <p:ph type="sldNum" sz="quarter" idx="12"/>
+          </p:nvPr>
+        </p:nvSpPr>
+        <p:spPr/>
+        <p:txBody>
+          <a:bodyPr/>
+          <a:lstStyle/>
+          <a:p>
+            <a:fld id="{55C60E94-3CC3-4E95-9EA1-45839018D89E}" type="slidenum">
+              <a:rPr lang="en-US" smtClean="0"/>
+              <a:t>15</a:t>
+            </a:fld>
+            <a:endParaRPr lang="en-US"/>
+          </a:p>
+        </p:txBody>
+      </p:sp>
+      <p:sp>
+        <p:nvSpPr>
+          <p:cNvPr id="7" name="Textfeld 6"/>
+          <p:cNvSpPr txBox="1"/>
+          <p:nvPr/>
+        </p:nvSpPr>
+        <p:spPr>
+          <a:xfrm>
+            <a:off x="1385849" y="1835890"/>
+            <a:ext cx="9237628" cy="4801314"/>
+          </a:xfrm>
+          <a:prstGeom prst="rect">
+            <a:avLst/>
+          </a:prstGeom>
+          <a:solidFill>
+            <a:srgbClr val="000000">
+              <a:alpha val="50196"/>
+            </a:srgbClr>
+          </a:solidFill>
+        </p:spPr>
+        <p:txBody>
+          <a:bodyPr wrap="square" rtlCol="0">
+            <a:spAutoFit/>
+          </a:bodyPr>
+          <a:lstStyle/>
+          <a:p>
+            <a:pPr marL="2114550" lvl="4" indent="-285750">
+              <a:buFont typeface="Arial" panose="020B0604020202020204" pitchFamily="34" charset="0"/>
+              <a:buChar char="•"/>
+            </a:pPr>
+            <a:endParaRPr lang="de-DE" dirty="0" smtClean="0"/>
+          </a:p>
+          <a:p>
+            <a:pPr marL="2114550" lvl="4" indent="-285750">
+              <a:buFont typeface="Arial" panose="020B0604020202020204" pitchFamily="34" charset="0"/>
+              <a:buChar char="•"/>
+            </a:pPr>
+            <a:r>
+              <a:rPr lang="de-DE" dirty="0" smtClean="0"/>
+              <a:t>Schnell, einfach und leichtgewichtig</a:t>
+            </a:r>
+          </a:p>
+          <a:p>
+            <a:pPr marL="2114550" lvl="4" indent="-285750">
+              <a:buFont typeface="Arial" panose="020B0604020202020204" pitchFamily="34" charset="0"/>
+              <a:buChar char="•"/>
+            </a:pPr>
+            <a:r>
+              <a:rPr lang="de-DE" i="1" dirty="0" err="1" smtClean="0"/>
+              <a:t>Seperation</a:t>
+            </a:r>
+            <a:r>
+              <a:rPr lang="de-DE" i="1" dirty="0" smtClean="0"/>
+              <a:t> </a:t>
+            </a:r>
+            <a:r>
+              <a:rPr lang="de-DE" i="1" dirty="0" err="1" smtClean="0"/>
+              <a:t>of</a:t>
+            </a:r>
+            <a:r>
+              <a:rPr lang="de-DE" i="1" dirty="0" smtClean="0"/>
+              <a:t> </a:t>
+            </a:r>
+            <a:r>
+              <a:rPr lang="de-DE" i="1" dirty="0" err="1" smtClean="0"/>
+              <a:t>Concerns</a:t>
+            </a:r>
+            <a:r>
+              <a:rPr lang="de-DE" dirty="0" smtClean="0"/>
+              <a:t> (dynamische vs. Statische Inhalte)</a:t>
+            </a:r>
+          </a:p>
+          <a:p>
+            <a:pPr marL="285750" indent="-285750">
+              <a:buFont typeface="Arial" panose="020B0604020202020204" pitchFamily="34" charset="0"/>
+              <a:buChar char="•"/>
+            </a:pPr>
+            <a:endParaRPr lang="de-DE" dirty="0"/>
+          </a:p>
+          <a:p>
+            <a:pPr marL="2114550" lvl="4" indent="-285750">
+              <a:buFont typeface="Arial" panose="020B0604020202020204" pitchFamily="34" charset="0"/>
+              <a:buChar char="•"/>
+            </a:pPr>
+            <a:r>
+              <a:rPr lang="de-DE" dirty="0" smtClean="0"/>
+              <a:t>Einfach und leichtgewichtig</a:t>
+            </a:r>
+          </a:p>
+          <a:p>
+            <a:pPr marL="2114550" lvl="4" indent="-285750">
+              <a:buFont typeface="Arial" panose="020B0604020202020204" pitchFamily="34" charset="0"/>
+              <a:buChar char="•"/>
+            </a:pPr>
+            <a:r>
+              <a:rPr lang="de-DE" dirty="0" smtClean="0"/>
+              <a:t>Erfahrung im Team (JavaScript und </a:t>
+            </a:r>
+            <a:r>
+              <a:rPr lang="de-DE" dirty="0" err="1" smtClean="0"/>
+              <a:t>NodeJS</a:t>
+            </a:r>
+            <a:r>
+              <a:rPr lang="de-DE" dirty="0" smtClean="0"/>
+              <a:t>)</a:t>
+            </a:r>
+          </a:p>
+          <a:p>
+            <a:pPr marL="285750" indent="-285750">
+              <a:buFont typeface="Arial" panose="020B0604020202020204" pitchFamily="34" charset="0"/>
+              <a:buChar char="•"/>
+            </a:pPr>
+            <a:endParaRPr lang="de-DE" dirty="0"/>
+          </a:p>
+          <a:p>
+            <a:pPr marL="2114550" lvl="4" indent="-285750">
+              <a:buFont typeface="Arial" panose="020B0604020202020204" pitchFamily="34" charset="0"/>
+              <a:buChar char="•"/>
+            </a:pPr>
+            <a:r>
+              <a:rPr lang="de-DE" dirty="0" smtClean="0"/>
+              <a:t>Wenig Implementierungs-Aufwand</a:t>
+            </a:r>
+          </a:p>
+          <a:p>
+            <a:pPr marL="2114550" lvl="4" indent="-285750">
+              <a:buFont typeface="Arial" panose="020B0604020202020204" pitchFamily="34" charset="0"/>
+              <a:buChar char="•"/>
+            </a:pPr>
+            <a:r>
+              <a:rPr lang="de-DE" dirty="0" smtClean="0"/>
+              <a:t>Crawler übernimmt </a:t>
+            </a:r>
+            <a:r>
+              <a:rPr lang="de-DE" dirty="0" err="1" smtClean="0"/>
+              <a:t>Indiyierungs</a:t>
+            </a:r>
+            <a:r>
+              <a:rPr lang="de-DE" dirty="0" smtClean="0"/>
+              <a:t>-Management</a:t>
+            </a:r>
+          </a:p>
+          <a:p>
+            <a:pPr marL="285750" indent="-285750">
+              <a:buFont typeface="Arial" panose="020B0604020202020204" pitchFamily="34" charset="0"/>
+              <a:buChar char="•"/>
+            </a:pPr>
+            <a:endParaRPr lang="de-DE" dirty="0"/>
+          </a:p>
+          <a:p>
+            <a:pPr marL="2114550" lvl="4" indent="-285750">
+              <a:buFont typeface="Arial" panose="020B0604020202020204" pitchFamily="34" charset="0"/>
+              <a:buChar char="•"/>
+            </a:pPr>
+            <a:r>
+              <a:rPr lang="de-DE" dirty="0" smtClean="0"/>
+              <a:t>Unterstützt anfallende Datenformate</a:t>
+            </a:r>
+          </a:p>
+          <a:p>
+            <a:pPr marL="2114550" lvl="4" indent="-285750">
+              <a:buFont typeface="Arial" panose="020B0604020202020204" pitchFamily="34" charset="0"/>
+              <a:buChar char="•"/>
+            </a:pPr>
+            <a:r>
+              <a:rPr lang="de-DE" dirty="0" smtClean="0"/>
+              <a:t>Abfragemöglichkeit nach verschiedensten Aspekten der Meta-Daten</a:t>
+            </a:r>
+          </a:p>
+          <a:p>
+            <a:pPr lvl="1"/>
+            <a:endParaRPr lang="de-DE" dirty="0" smtClean="0"/>
+          </a:p>
+          <a:p>
+            <a:pPr marL="2114550" lvl="4" indent="-285750">
+              <a:buFont typeface="Arial" panose="020B0604020202020204" pitchFamily="34" charset="0"/>
+              <a:buChar char="•"/>
+            </a:pPr>
+            <a:r>
+              <a:rPr lang="de-DE" dirty="0" smtClean="0"/>
+              <a:t>Erfahrung im Team</a:t>
+            </a:r>
+          </a:p>
+          <a:p>
+            <a:pPr marL="2114550" lvl="4" indent="-285750">
+              <a:buFont typeface="Arial" panose="020B0604020202020204" pitchFamily="34" charset="0"/>
+              <a:buChar char="•"/>
+            </a:pPr>
+            <a:r>
+              <a:rPr lang="de-DE" dirty="0" smtClean="0"/>
+              <a:t>Bewährte Umgebung für </a:t>
+            </a:r>
+            <a:r>
+              <a:rPr lang="de-DE" dirty="0" err="1" smtClean="0"/>
+              <a:t>Frontends</a:t>
+            </a:r>
+            <a:endParaRPr lang="de-DE" dirty="0" smtClean="0"/>
+          </a:p>
+          <a:p>
+            <a:pPr marL="2114550" lvl="4" indent="-285750">
+              <a:buFont typeface="Arial" panose="020B0604020202020204" pitchFamily="34" charset="0"/>
+              <a:buChar char="•"/>
+            </a:pPr>
+            <a:endParaRPr lang="de-DE" dirty="0" smtClean="0"/>
+          </a:p>
+        </p:txBody>
+      </p:sp>
+      <p:grpSp>
+        <p:nvGrpSpPr>
+          <p:cNvPr id="15" name="Gruppieren 14"/>
+          <p:cNvGrpSpPr/>
+          <p:nvPr/>
+        </p:nvGrpSpPr>
+        <p:grpSpPr>
+          <a:xfrm>
+            <a:off x="1617880" y="2028315"/>
+            <a:ext cx="1440000" cy="868604"/>
+            <a:chOff x="890427" y="2244537"/>
+            <a:chExt cx="1440000" cy="868604"/>
+          </a:xfrm>
+        </p:grpSpPr>
+        <p:sp>
+          <p:nvSpPr>
+            <p:cNvPr id="5" name="Rechteck 4"/>
+            <p:cNvSpPr/>
+            <p:nvPr/>
+          </p:nvSpPr>
+          <p:spPr>
+            <a:xfrm>
+              <a:off x="890427" y="2308497"/>
+              <a:ext cx="1440000" cy="750013"/>
+            </a:xfrm>
+            <a:prstGeom prst="rect">
+              <a:avLst/>
+            </a:prstGeom>
+          </p:spPr>
+          <p:style>
+            <a:lnRef idx="2">
+              <a:schemeClr val="accent1"/>
+            </a:lnRef>
+            <a:fillRef idx="1">
+              <a:schemeClr val="lt1"/>
+            </a:fillRef>
+            <a:effectRef idx="0">
+              <a:schemeClr val="accent1"/>
+            </a:effectRef>
+            <a:fontRef idx="minor">
+              <a:schemeClr val="dk1"/>
+            </a:fontRef>
+          </p:style>
+          <p:txBody>
+            <a:bodyPr rtlCol="0" anchor="ctr"/>
+            <a:lstStyle/>
+            <a:p>
+              <a:pPr algn="ctr"/>
+              <a:endParaRPr lang="en-US" dirty="0"/>
+            </a:p>
+          </p:txBody>
+        </p:sp>
+        <p:pic>
+          <p:nvPicPr>
+            <p:cNvPr id="6" name="Picture 2" descr="http://voidcanvas.com/wp-content/uploads/2015/10/Nginx-Logo.png"/>
+            <p:cNvPicPr>
+              <a:picLocks noChangeAspect="1" noChangeArrowheads="1"/>
+            </p:cNvPicPr>
+            <p:nvPr/>
+          </p:nvPicPr>
+          <p:blipFill>
+            <a:blip r:embed="rId2" cstate="print">
+              <a:extLst>
+                <a:ext uri="{28A0092B-C50C-407E-A947-70E740481C1C}">
+                  <a14:useLocalDpi xmlns:a14="http://schemas.microsoft.com/office/drawing/2010/main" val="0"/>
+                </a:ext>
+              </a:extLst>
+            </a:blip>
+            <a:srcRect/>
+            <a:stretch>
+              <a:fillRect/>
+            </a:stretch>
+          </p:blipFill>
+          <p:spPr bwMode="auto">
+            <a:xfrm>
+              <a:off x="1176125" y="2244537"/>
+              <a:ext cx="868604" cy="868604"/>
+            </a:xfrm>
+            <a:prstGeom prst="rect">
+              <a:avLst/>
+            </a:prstGeom>
+            <a:noFill/>
+            <a:extLst>
+              <a:ext uri="{909E8E84-426E-40DD-AFC4-6F175D3DCCD1}">
+                <a14:hiddenFill xmlns:a14="http://schemas.microsoft.com/office/drawing/2010/main">
+                  <a:solidFill>
+                    <a:srgbClr val="FFFFFF"/>
+                  </a:solidFill>
+                </a14:hiddenFill>
+              </a:ext>
+            </a:extLst>
+          </p:spPr>
+        </p:pic>
+      </p:grpSp>
+      <p:grpSp>
+        <p:nvGrpSpPr>
+          <p:cNvPr id="16" name="Gruppieren 15"/>
+          <p:cNvGrpSpPr/>
+          <p:nvPr/>
+        </p:nvGrpSpPr>
+        <p:grpSpPr>
+          <a:xfrm>
+            <a:off x="1617880" y="2898945"/>
+            <a:ext cx="1440000" cy="750013"/>
+            <a:chOff x="878143" y="3202904"/>
+            <a:chExt cx="1440000" cy="750013"/>
+          </a:xfrm>
+        </p:grpSpPr>
+        <p:sp>
+          <p:nvSpPr>
+            <p:cNvPr id="8" name="Rechteck 7"/>
+            <p:cNvSpPr/>
+            <p:nvPr/>
+          </p:nvSpPr>
+          <p:spPr>
+            <a:xfrm>
+              <a:off x="878143" y="3202904"/>
+              <a:ext cx="1440000" cy="750013"/>
+            </a:xfrm>
+            <a:prstGeom prst="rect">
+              <a:avLst/>
+            </a:prstGeom>
+          </p:spPr>
+          <p:style>
+            <a:lnRef idx="2">
+              <a:schemeClr val="accent1"/>
+            </a:lnRef>
+            <a:fillRef idx="1">
+              <a:schemeClr val="lt1"/>
+            </a:fillRef>
+            <a:effectRef idx="0">
+              <a:schemeClr val="accent1"/>
+            </a:effectRef>
+            <a:fontRef idx="minor">
+              <a:schemeClr val="dk1"/>
+            </a:fontRef>
+          </p:style>
+          <p:txBody>
+            <a:bodyPr rtlCol="0" anchor="ctr"/>
+            <a:lstStyle/>
+            <a:p>
+              <a:pPr algn="ctr"/>
+              <a:endParaRPr lang="en-US" dirty="0"/>
+            </a:p>
+          </p:txBody>
+        </p:sp>
+        <p:pic>
+          <p:nvPicPr>
+            <p:cNvPr id="9" name="Picture 4" descr="https://dab1nmslvvntp.cloudfront.net/wp-content/uploads/2015/07/1436439824nodejs-logo.png"/>
+            <p:cNvPicPr>
+              <a:picLocks noChangeAspect="1" noChangeArrowheads="1"/>
+            </p:cNvPicPr>
+            <p:nvPr/>
+          </p:nvPicPr>
+          <p:blipFill rotWithShape="1">
+            <a:blip r:embed="rId3" cstate="print">
+              <a:extLst>
+                <a:ext uri="{28A0092B-C50C-407E-A947-70E740481C1C}">
+                  <a14:useLocalDpi xmlns:a14="http://schemas.microsoft.com/office/drawing/2010/main" val="0"/>
+                </a:ext>
+              </a:extLst>
+            </a:blip>
+            <a:srcRect l="2007" t="20171" r="5445" b="20048"/>
+            <a:stretch/>
+          </p:blipFill>
+          <p:spPr bwMode="auto">
+            <a:xfrm>
+              <a:off x="908771" y="3353762"/>
+              <a:ext cx="1378744" cy="445294"/>
+            </a:xfrm>
+            <a:prstGeom prst="rect">
+              <a:avLst/>
+            </a:prstGeom>
+            <a:noFill/>
+            <a:extLst>
+              <a:ext uri="{909E8E84-426E-40DD-AFC4-6F175D3DCCD1}">
+                <a14:hiddenFill xmlns:a14="http://schemas.microsoft.com/office/drawing/2010/main">
+                  <a:solidFill>
+                    <a:srgbClr val="FFFFFF"/>
+                  </a:solidFill>
+                </a14:hiddenFill>
+              </a:ext>
+            </a:extLst>
+          </p:spPr>
+        </p:pic>
+      </p:grpSp>
+      <p:grpSp>
+        <p:nvGrpSpPr>
+          <p:cNvPr id="17" name="Gruppieren 16"/>
+          <p:cNvGrpSpPr/>
+          <p:nvPr/>
+        </p:nvGrpSpPr>
+        <p:grpSpPr>
+          <a:xfrm>
+            <a:off x="1617880" y="3717127"/>
+            <a:ext cx="1440000" cy="767426"/>
+            <a:chOff x="871514" y="4097311"/>
+            <a:chExt cx="1440000" cy="767426"/>
+          </a:xfrm>
+        </p:grpSpPr>
+        <p:sp>
+          <p:nvSpPr>
+            <p:cNvPr id="10" name="Rechteck 9"/>
+            <p:cNvSpPr/>
+            <p:nvPr/>
+          </p:nvSpPr>
+          <p:spPr>
+            <a:xfrm>
+              <a:off x="871514" y="4102606"/>
+              <a:ext cx="1440000" cy="750013"/>
+            </a:xfrm>
+            <a:prstGeom prst="rect">
+              <a:avLst/>
+            </a:prstGeom>
+          </p:spPr>
+          <p:style>
+            <a:lnRef idx="2">
+              <a:schemeClr val="accent1"/>
+            </a:lnRef>
+            <a:fillRef idx="1">
+              <a:schemeClr val="lt1"/>
+            </a:fillRef>
+            <a:effectRef idx="0">
+              <a:schemeClr val="accent1"/>
+            </a:effectRef>
+            <a:fontRef idx="minor">
+              <a:schemeClr val="dk1"/>
+            </a:fontRef>
+          </p:style>
+          <p:txBody>
+            <a:bodyPr rtlCol="0" anchor="ctr"/>
+            <a:lstStyle/>
+            <a:p>
+              <a:pPr algn="ctr"/>
+              <a:endParaRPr lang="en-US" dirty="0"/>
+            </a:p>
+          </p:txBody>
+        </p:sp>
+        <p:pic>
+          <p:nvPicPr>
+            <p:cNvPr id="11" name="Picture 6" descr="http://cdn.dreamcss.com/wp-content/uploads/OpenSearchServer.png"/>
+            <p:cNvPicPr>
+              <a:picLocks noChangeAspect="1" noChangeArrowheads="1"/>
+            </p:cNvPicPr>
+            <p:nvPr/>
+          </p:nvPicPr>
+          <p:blipFill>
+            <a:blip r:embed="rId4">
+              <a:extLst>
+                <a:ext uri="{28A0092B-C50C-407E-A947-70E740481C1C}">
+                  <a14:useLocalDpi xmlns:a14="http://schemas.microsoft.com/office/drawing/2010/main" val="0"/>
+                </a:ext>
+              </a:extLst>
+            </a:blip>
+            <a:srcRect/>
+            <a:stretch>
+              <a:fillRect/>
+            </a:stretch>
+          </p:blipFill>
+          <p:spPr bwMode="auto">
+            <a:xfrm>
+              <a:off x="1193229" y="4097311"/>
+              <a:ext cx="796567" cy="767426"/>
+            </a:xfrm>
+            <a:prstGeom prst="rect">
+              <a:avLst/>
+            </a:prstGeom>
+            <a:noFill/>
+            <a:extLst>
+              <a:ext uri="{909E8E84-426E-40DD-AFC4-6F175D3DCCD1}">
+                <a14:hiddenFill xmlns:a14="http://schemas.microsoft.com/office/drawing/2010/main">
+                  <a:solidFill>
+                    <a:srgbClr val="FFFFFF"/>
+                  </a:solidFill>
+                </a14:hiddenFill>
+              </a:ext>
+            </a:extLst>
+          </p:spPr>
+        </p:pic>
+      </p:grpSp>
+      <p:grpSp>
+        <p:nvGrpSpPr>
+          <p:cNvPr id="18" name="Gruppieren 17"/>
+          <p:cNvGrpSpPr/>
+          <p:nvPr/>
+        </p:nvGrpSpPr>
+        <p:grpSpPr>
+          <a:xfrm>
+            <a:off x="1854992" y="4545899"/>
+            <a:ext cx="965771" cy="965771"/>
+            <a:chOff x="1024025" y="5002308"/>
+            <a:chExt cx="965771" cy="965771"/>
+          </a:xfrm>
+        </p:grpSpPr>
+        <p:sp>
+          <p:nvSpPr>
+            <p:cNvPr id="12" name="Flussdiagramm: Magnetplattenspeicher 11"/>
+            <p:cNvSpPr/>
+            <p:nvPr/>
+          </p:nvSpPr>
+          <p:spPr>
+            <a:xfrm>
+              <a:off x="1024025" y="5002308"/>
+              <a:ext cx="965771" cy="965771"/>
+            </a:xfrm>
+            <a:prstGeom prst="flowChartMagneticDisk">
+              <a:avLst/>
+            </a:prstGeom>
+          </p:spPr>
+          <p:style>
+            <a:lnRef idx="2">
+              <a:schemeClr val="accent1"/>
+            </a:lnRef>
+            <a:fillRef idx="1">
+              <a:schemeClr val="lt1"/>
+            </a:fillRef>
+            <a:effectRef idx="0">
+              <a:schemeClr val="accent1"/>
+            </a:effectRef>
+            <a:fontRef idx="minor">
+              <a:schemeClr val="dk1"/>
+            </a:fontRef>
+          </p:style>
+          <p:txBody>
+            <a:bodyPr rtlCol="0" anchor="ctr"/>
+            <a:lstStyle/>
+            <a:p>
+              <a:pPr algn="ctr"/>
+              <a:endParaRPr lang="en-US" dirty="0"/>
+            </a:p>
+          </p:txBody>
+        </p:sp>
+        <p:pic>
+          <p:nvPicPr>
+            <p:cNvPr id="13" name="Picture 10" descr="http://www.theodo.fr/uploads/blog/2015/11/mongodb.png"/>
+            <p:cNvPicPr>
+              <a:picLocks noChangeAspect="1" noChangeArrowheads="1"/>
+            </p:cNvPicPr>
+            <p:nvPr/>
+          </p:nvPicPr>
+          <p:blipFill rotWithShape="1">
+            <a:blip r:embed="rId5" cstate="print">
+              <a:extLst>
+                <a:ext uri="{28A0092B-C50C-407E-A947-70E740481C1C}">
+                  <a14:useLocalDpi xmlns:a14="http://schemas.microsoft.com/office/drawing/2010/main" val="0"/>
+                </a:ext>
+              </a:extLst>
+            </a:blip>
+            <a:srcRect l="10099" t="8871" r="8909" b="10058"/>
+            <a:stretch/>
+          </p:blipFill>
+          <p:spPr bwMode="auto">
+            <a:xfrm>
+              <a:off x="1181100" y="5111749"/>
+              <a:ext cx="660400" cy="774701"/>
+            </a:xfrm>
+            <a:prstGeom prst="rect">
+              <a:avLst/>
+            </a:prstGeom>
+            <a:noFill/>
+            <a:extLst>
+              <a:ext uri="{909E8E84-426E-40DD-AFC4-6F175D3DCCD1}">
+                <a14:hiddenFill xmlns:a14="http://schemas.microsoft.com/office/drawing/2010/main">
+                  <a:solidFill>
+                    <a:srgbClr val="FFFFFF"/>
+                  </a:solidFill>
+                </a14:hiddenFill>
+              </a:ext>
+            </a:extLst>
+          </p:spPr>
+        </p:pic>
+      </p:grpSp>
+      <p:pic>
+        <p:nvPicPr>
+          <p:cNvPr id="14" name="Picture 14" descr="https://angular.io/resources/images/logos/standard/shield-large.png"/>
+          <p:cNvPicPr>
+            <a:picLocks noChangeAspect="1" noChangeArrowheads="1"/>
+          </p:cNvPicPr>
+          <p:nvPr/>
+        </p:nvPicPr>
+        <p:blipFill>
+          <a:blip r:embed="rId6">
+            <a:extLst>
+              <a:ext uri="{28A0092B-C50C-407E-A947-70E740481C1C}">
+                <a14:useLocalDpi xmlns:a14="http://schemas.microsoft.com/office/drawing/2010/main" val="0"/>
+              </a:ext>
+            </a:extLst>
+          </a:blip>
+          <a:srcRect/>
+          <a:stretch>
+            <a:fillRect/>
+          </a:stretch>
+        </p:blipFill>
+        <p:spPr bwMode="auto">
+          <a:xfrm>
+            <a:off x="1841077" y="5511670"/>
+            <a:ext cx="993600" cy="1080000"/>
+          </a:xfrm>
+          <a:prstGeom prst="rect">
+            <a:avLst/>
+          </a:prstGeom>
+          <a:noFill/>
+          <a:extLst>
+            <a:ext uri="{909E8E84-426E-40DD-AFC4-6F175D3DCCD1}">
+              <a14:hiddenFill xmlns:a14="http://schemas.microsoft.com/office/drawing/2010/main">
+                <a:solidFill>
+                  <a:srgbClr val="FFFFFF"/>
+                </a:solidFill>
+              </a14:hiddenFill>
+            </a:ext>
+          </a:extLst>
+        </p:spPr>
+      </p:pic>
+    </p:spTree>
+    <p:extLst>
+      <p:ext uri="{BB962C8B-B14F-4D97-AF65-F5344CB8AC3E}">
+        <p14:creationId xmlns:p14="http://schemas.microsoft.com/office/powerpoint/2010/main" val="1388536504"/>
+      </p:ext>
+    </p:extLst>
+  </p:cSld>
+  <p:clrMapOvr>
+    <a:masterClrMapping/>
+  </p:clrMapOvr>
+</p:sld>
+</file>
+
+<file path=ppt/slides/slide16.xml><?xml version="1.0" encoding="utf-8"?>
 <p:sld xmlns:a="http://schemas.openxmlformats.org/drawingml/2006/main" xmlns:r="http://schemas.openxmlformats.org/officeDocument/2006/relationships" xmlns:p="http://schemas.openxmlformats.org/presentationml/2006/main" show="0">
   <p:cSld>
     <p:spTree>
@@ -33787,7 +34929,7 @@
           <a:p>
             <a:fld id="{55C60E94-3CC3-4E95-9EA1-45839018D89E}" type="slidenum">
               <a:rPr lang="en-US" smtClean="0"/>
-              <a:t>15</a:t>
+              <a:t>16</a:t>
             </a:fld>
             <a:endParaRPr lang="en-US"/>
           </a:p>
@@ -33821,7 +34963,7 @@
 </p:sld>
 </file>
 
-<file path=ppt/slides/slide16.xml><?xml version="1.0" encoding="utf-8"?>
+<file path=ppt/slides/slide17.xml><?xml version="1.0" encoding="utf-8"?>
 <p:sld xmlns:a="http://schemas.openxmlformats.org/drawingml/2006/main" xmlns:r="http://schemas.openxmlformats.org/officeDocument/2006/relationships" xmlns:p="http://schemas.openxmlformats.org/presentationml/2006/main" show="0">
   <p:cSld>
     <p:spTree>
@@ -34282,7 +35424,7 @@
           <a:p>
             <a:fld id="{55C60E94-3CC3-4E95-9EA1-45839018D89E}" type="slidenum">
               <a:rPr lang="en-US" smtClean="0"/>
-              <a:t>16</a:t>
+              <a:t>17</a:t>
             </a:fld>
             <a:endParaRPr lang="en-US"/>
           </a:p>
@@ -34309,7 +35451,7 @@
 </p:sld>
 </file>
 
-<file path=ppt/slides/slide17.xml><?xml version="1.0" encoding="utf-8"?>
+<file path=ppt/slides/slide18.xml><?xml version="1.0" encoding="utf-8"?>
 <p:sld xmlns:a="http://schemas.openxmlformats.org/drawingml/2006/main" xmlns:r="http://schemas.openxmlformats.org/officeDocument/2006/relationships" xmlns:p="http://schemas.openxmlformats.org/presentationml/2006/main" show="0">
   <p:cSld>
     <p:spTree>
@@ -34482,7 +35624,7 @@
           <a:p>
             <a:fld id="{55C60E94-3CC3-4E95-9EA1-45839018D89E}" type="slidenum">
               <a:rPr lang="en-US" smtClean="0"/>
-              <a:t>17</a:t>
+              <a:t>18</a:t>
             </a:fld>
             <a:endParaRPr lang="en-US"/>
           </a:p>
@@ -34516,7 +35658,7 @@
 </p:sld>
 </file>
 
-<file path=ppt/slides/slide18.xml><?xml version="1.0" encoding="utf-8"?>
+<file path=ppt/slides/slide19.xml><?xml version="1.0" encoding="utf-8"?>
 <p:sld xmlns:a="http://schemas.openxmlformats.org/drawingml/2006/main" xmlns:r="http://schemas.openxmlformats.org/officeDocument/2006/relationships" xmlns:p="http://schemas.openxmlformats.org/presentationml/2006/main" show="0">
   <p:cSld>
     <p:spTree>
@@ -34598,7 +35740,7 @@
           <a:p>
             <a:fld id="{55C60E94-3CC3-4E95-9EA1-45839018D89E}" type="slidenum">
               <a:rPr lang="en-US" smtClean="0"/>
-              <a:t>18</a:t>
+              <a:t>19</a:t>
             </a:fld>
             <a:endParaRPr lang="en-US"/>
           </a:p>
@@ -34632,7 +35774,115 @@
 </p:sld>
 </file>
 
-<file path=ppt/slides/slide19.xml><?xml version="1.0" encoding="utf-8"?>
+<file path=ppt/slides/slide2.xml><?xml version="1.0" encoding="utf-8"?>
+<p:sld xmlns:a="http://schemas.openxmlformats.org/drawingml/2006/main" xmlns:r="http://schemas.openxmlformats.org/officeDocument/2006/relationships" xmlns:p="http://schemas.openxmlformats.org/presentationml/2006/main">
+  <p:cSld>
+    <p:spTree>
+      <p:nvGrpSpPr>
+        <p:cNvPr id="1" name=""/>
+        <p:cNvGrpSpPr/>
+        <p:nvPr/>
+      </p:nvGrpSpPr>
+      <p:grpSpPr>
+        <a:xfrm>
+          <a:off x="0" y="0"/>
+          <a:ext cx="0" cy="0"/>
+          <a:chOff x="0" y="0"/>
+          <a:chExt cx="0" cy="0"/>
+        </a:xfrm>
+      </p:grpSpPr>
+      <p:sp>
+        <p:nvSpPr>
+          <p:cNvPr id="2" name="Titel 1"/>
+          <p:cNvSpPr>
+            <a:spLocks noGrp="1"/>
+          </p:cNvSpPr>
+          <p:nvPr>
+            <p:ph type="title"/>
+          </p:nvPr>
+        </p:nvSpPr>
+        <p:spPr/>
+        <p:txBody>
+          <a:bodyPr/>
+          <a:lstStyle/>
+          <a:p>
+            <a:r>
+              <a:rPr lang="de-DE" dirty="0" smtClean="0"/>
+              <a:t>Programmiersprache</a:t>
+            </a:r>
+            <a:endParaRPr lang="de-DE" dirty="0"/>
+          </a:p>
+        </p:txBody>
+      </p:sp>
+      <p:graphicFrame>
+        <p:nvGraphicFramePr>
+          <p:cNvPr id="8" name="Inhaltsplatzhalter 7"/>
+          <p:cNvGraphicFramePr>
+            <a:graphicFrameLocks noGrp="1"/>
+          </p:cNvGraphicFramePr>
+          <p:nvPr>
+            <p:ph idx="1"/>
+            <p:extLst>
+              <p:ext uri="{D42A27DB-BD31-4B8C-83A1-F6EECF244321}">
+                <p14:modId xmlns:p14="http://schemas.microsoft.com/office/powerpoint/2010/main" val="3382662608"/>
+              </p:ext>
+            </p:extLst>
+          </p:nvPr>
+        </p:nvGraphicFramePr>
+        <p:xfrm>
+          <a:off x="1103313" y="2052638"/>
+          <a:ext cx="8947150" cy="4195762"/>
+        </p:xfrm>
+        <a:graphic>
+          <a:graphicData uri="http://schemas.openxmlformats.org/drawingml/2006/chart">
+            <c:chart xmlns:c="http://schemas.openxmlformats.org/drawingml/2006/chart" xmlns:r="http://schemas.openxmlformats.org/officeDocument/2006/relationships" r:id="rId2"/>
+          </a:graphicData>
+        </a:graphic>
+      </p:graphicFrame>
+      <p:sp>
+        <p:nvSpPr>
+          <p:cNvPr id="4" name="Foliennummernplatzhalter 3"/>
+          <p:cNvSpPr>
+            <a:spLocks noGrp="1"/>
+          </p:cNvSpPr>
+          <p:nvPr>
+            <p:ph type="sldNum" sz="quarter" idx="12"/>
+          </p:nvPr>
+        </p:nvSpPr>
+        <p:spPr/>
+        <p:txBody>
+          <a:bodyPr/>
+          <a:lstStyle/>
+          <a:p>
+            <a:fld id="{55C60E94-3CC3-4E95-9EA1-45839018D89E}" type="slidenum">
+              <a:rPr lang="en-US" smtClean="0"/>
+              <a:t>2</a:t>
+            </a:fld>
+            <a:endParaRPr lang="en-US"/>
+          </a:p>
+        </p:txBody>
+      </p:sp>
+    </p:spTree>
+    <p:extLst>
+      <p:ext uri="{BB962C8B-B14F-4D97-AF65-F5344CB8AC3E}">
+        <p14:creationId xmlns:p14="http://schemas.microsoft.com/office/powerpoint/2010/main" val="1633502625"/>
+      </p:ext>
+    </p:extLst>
+  </p:cSld>
+  <p:clrMapOvr>
+    <a:masterClrMapping/>
+  </p:clrMapOvr>
+  <p:timing>
+    <p:tnLst>
+      <p:par>
+        <p:cTn id="1" dur="indefinite" restart="never" nodeType="tmRoot"/>
+      </p:par>
+    </p:tnLst>
+  </p:timing>
+</p:sld>
+</file>
+
+<file path=ppt/slides/slide20.xml><?xml version="1.0" encoding="utf-8"?>
 <p:sld xmlns:a="http://schemas.openxmlformats.org/drawingml/2006/main" xmlns:r="http://schemas.openxmlformats.org/officeDocument/2006/relationships" xmlns:p="http://schemas.openxmlformats.org/presentationml/2006/main" show="0">
   <p:cSld>
     <p:spTree>
@@ -34814,7 +36064,7 @@
           <a:p>
             <a:fld id="{55C60E94-3CC3-4E95-9EA1-45839018D89E}" type="slidenum">
               <a:rPr lang="en-US" smtClean="0"/>
-              <a:t>19</a:t>
+              <a:t>20</a:t>
             </a:fld>
             <a:endParaRPr lang="en-US"/>
           </a:p>
@@ -34848,115 +36098,7 @@
 </p:sld>
 </file>
 
-<file path=ppt/slides/slide2.xml><?xml version="1.0" encoding="utf-8"?>
-<p:sld xmlns:a="http://schemas.openxmlformats.org/drawingml/2006/main" xmlns:r="http://schemas.openxmlformats.org/officeDocument/2006/relationships" xmlns:p="http://schemas.openxmlformats.org/presentationml/2006/main">
-  <p:cSld>
-    <p:spTree>
-      <p:nvGrpSpPr>
-        <p:cNvPr id="1" name=""/>
-        <p:cNvGrpSpPr/>
-        <p:nvPr/>
-      </p:nvGrpSpPr>
-      <p:grpSpPr>
-        <a:xfrm>
-          <a:off x="0" y="0"/>
-          <a:ext cx="0" cy="0"/>
-          <a:chOff x="0" y="0"/>
-          <a:chExt cx="0" cy="0"/>
-        </a:xfrm>
-      </p:grpSpPr>
-      <p:sp>
-        <p:nvSpPr>
-          <p:cNvPr id="2" name="Titel 1"/>
-          <p:cNvSpPr>
-            <a:spLocks noGrp="1"/>
-          </p:cNvSpPr>
-          <p:nvPr>
-            <p:ph type="title"/>
-          </p:nvPr>
-        </p:nvSpPr>
-        <p:spPr/>
-        <p:txBody>
-          <a:bodyPr/>
-          <a:lstStyle/>
-          <a:p>
-            <a:r>
-              <a:rPr lang="de-DE" dirty="0" smtClean="0"/>
-              <a:t>Programmiersprache</a:t>
-            </a:r>
-            <a:endParaRPr lang="de-DE" dirty="0"/>
-          </a:p>
-        </p:txBody>
-      </p:sp>
-      <p:graphicFrame>
-        <p:nvGraphicFramePr>
-          <p:cNvPr id="8" name="Inhaltsplatzhalter 7"/>
-          <p:cNvGraphicFramePr>
-            <a:graphicFrameLocks noGrp="1"/>
-          </p:cNvGraphicFramePr>
-          <p:nvPr>
-            <p:ph idx="1"/>
-            <p:extLst>
-              <p:ext uri="{D42A27DB-BD31-4B8C-83A1-F6EECF244321}">
-                <p14:modId xmlns:p14="http://schemas.microsoft.com/office/powerpoint/2010/main" val="3706423688"/>
-              </p:ext>
-            </p:extLst>
-          </p:nvPr>
-        </p:nvGraphicFramePr>
-        <p:xfrm>
-          <a:off x="1103313" y="2052638"/>
-          <a:ext cx="8947150" cy="4195762"/>
-        </p:xfrm>
-        <a:graphic>
-          <a:graphicData uri="http://schemas.openxmlformats.org/drawingml/2006/chart">
-            <c:chart xmlns:c="http://schemas.openxmlformats.org/drawingml/2006/chart" xmlns:r="http://schemas.openxmlformats.org/officeDocument/2006/relationships" r:id="rId2"/>
-          </a:graphicData>
-        </a:graphic>
-      </p:graphicFrame>
-      <p:sp>
-        <p:nvSpPr>
-          <p:cNvPr id="4" name="Foliennummernplatzhalter 3"/>
-          <p:cNvSpPr>
-            <a:spLocks noGrp="1"/>
-          </p:cNvSpPr>
-          <p:nvPr>
-            <p:ph type="sldNum" sz="quarter" idx="12"/>
-          </p:nvPr>
-        </p:nvSpPr>
-        <p:spPr/>
-        <p:txBody>
-          <a:bodyPr/>
-          <a:lstStyle/>
-          <a:p>
-            <a:fld id="{55C60E94-3CC3-4E95-9EA1-45839018D89E}" type="slidenum">
-              <a:rPr lang="en-US" smtClean="0"/>
-              <a:t>2</a:t>
-            </a:fld>
-            <a:endParaRPr lang="en-US"/>
-          </a:p>
-        </p:txBody>
-      </p:sp>
-    </p:spTree>
-    <p:extLst>
-      <p:ext uri="{BB962C8B-B14F-4D97-AF65-F5344CB8AC3E}">
-        <p14:creationId xmlns:p14="http://schemas.microsoft.com/office/powerpoint/2010/main" val="1633502625"/>
-      </p:ext>
-    </p:extLst>
-  </p:cSld>
-  <p:clrMapOvr>
-    <a:masterClrMapping/>
-  </p:clrMapOvr>
-  <p:timing>
-    <p:tnLst>
-      <p:par>
-        <p:cTn id="1" dur="indefinite" restart="never" nodeType="tmRoot"/>
-      </p:par>
-    </p:tnLst>
-  </p:timing>
-</p:sld>
-</file>
-
-<file path=ppt/slides/slide20.xml><?xml version="1.0" encoding="utf-8"?>
+<file path=ppt/slides/slide21.xml><?xml version="1.0" encoding="utf-8"?>
 <p:sld xmlns:a="http://schemas.openxmlformats.org/drawingml/2006/main" xmlns:r="http://schemas.openxmlformats.org/officeDocument/2006/relationships" xmlns:p="http://schemas.openxmlformats.org/presentationml/2006/main" show="0">
   <p:cSld>
     <p:spTree>
@@ -35417,7 +36559,7 @@
           <a:p>
             <a:fld id="{55C60E94-3CC3-4E95-9EA1-45839018D89E}" type="slidenum">
               <a:rPr lang="en-US" smtClean="0"/>
-              <a:t>20</a:t>
+              <a:t>21</a:t>
             </a:fld>
             <a:endParaRPr lang="en-US"/>
           </a:p>

</xml_diff>